<commit_message>
Subir mapa mental en html
</commit_message>
<xml_diff>
--- a/presentacion/graficas_explotacion.pptx
+++ b/presentacion/graficas_explotacion.pptx
@@ -5,14 +5,18 @@
     <p:sldMasterId id="2147483648" r:id="rId1"/>
   </p:sldMasterIdLst>
   <p:notesMasterIdLst>
-    <p:notesMasterId r:id="rId7"/>
+    <p:notesMasterId r:id="rId11"/>
   </p:notesMasterIdLst>
   <p:sldIdLst>
-    <p:sldId id="257" r:id="rId2"/>
-    <p:sldId id="258" r:id="rId3"/>
-    <p:sldId id="261" r:id="rId4"/>
-    <p:sldId id="262" r:id="rId5"/>
-    <p:sldId id="264" r:id="rId6"/>
+    <p:sldId id="268" r:id="rId2"/>
+    <p:sldId id="257" r:id="rId3"/>
+    <p:sldId id="258" r:id="rId4"/>
+    <p:sldId id="261" r:id="rId5"/>
+    <p:sldId id="266" r:id="rId6"/>
+    <p:sldId id="262" r:id="rId7"/>
+    <p:sldId id="267" r:id="rId8"/>
+    <p:sldId id="264" r:id="rId9"/>
+    <p:sldId id="265" r:id="rId10"/>
   </p:sldIdLst>
   <p:sldSz cx="12192000" cy="6858000"/>
   <p:notesSz cx="6858000" cy="9144000"/>
@@ -5927,7 +5931,7 @@
           <a:p>
             <a:fld id="{722897CA-62A3-FF4A-8236-48D12DED5039}" type="datetimeFigureOut">
               <a:rPr lang="es-ES" smtClean="0"/>
-              <a:t>15/9/25</a:t>
+              <a:t>30/9/25</a:t>
             </a:fld>
             <a:endParaRPr lang="es-ES"/>
           </a:p>
@@ -6085,7 +6089,7 @@
           <a:p>
             <a:fld id="{4AFF654C-F8D3-7F4E-82AA-5CDF7A5824F6}" type="slidenum">
               <a:rPr lang="es-ES" smtClean="0"/>
-              <a:t>‹#›</a:t>
+              <a:t>‹Nº›</a:t>
             </a:fld>
             <a:endParaRPr lang="es-ES"/>
           </a:p>
@@ -6259,7 +6263,7 @@
           <a:p>
             <a:fld id="{4AFF654C-F8D3-7F4E-82AA-5CDF7A5824F6}" type="slidenum">
               <a:rPr lang="es-ES" smtClean="0"/>
-              <a:t>5</a:t>
+              <a:t>8</a:t>
             </a:fld>
             <a:endParaRPr lang="es-ES"/>
           </a:p>
@@ -6427,7 +6431,7 @@
           <a:p>
             <a:fld id="{BDD2585B-0C3F-E94A-B774-0A46A528480F}" type="datetimeFigureOut">
               <a:rPr lang="en-ES" smtClean="0"/>
-              <a:t>15/9/25</a:t>
+              <a:t>9/30/25</a:t>
             </a:fld>
             <a:endParaRPr lang="en-ES"/>
           </a:p>
@@ -6481,7 +6485,7 @@
           <a:p>
             <a:fld id="{4495FFAA-CA92-8C49-8FEF-6F491738F4F9}" type="slidenum">
               <a:rPr lang="en-ES" smtClean="0"/>
-              <a:t>‹#›</a:t>
+              <a:t>‹Nº›</a:t>
             </a:fld>
             <a:endParaRPr lang="en-ES"/>
           </a:p>
@@ -6627,7 +6631,7 @@
           <a:p>
             <a:fld id="{BDD2585B-0C3F-E94A-B774-0A46A528480F}" type="datetimeFigureOut">
               <a:rPr lang="en-ES" smtClean="0"/>
-              <a:t>15/9/25</a:t>
+              <a:t>9/30/25</a:t>
             </a:fld>
             <a:endParaRPr lang="en-ES"/>
           </a:p>
@@ -6681,7 +6685,7 @@
           <a:p>
             <a:fld id="{4495FFAA-CA92-8C49-8FEF-6F491738F4F9}" type="slidenum">
               <a:rPr lang="en-ES" smtClean="0"/>
-              <a:t>‹#›</a:t>
+              <a:t>‹Nº›</a:t>
             </a:fld>
             <a:endParaRPr lang="en-ES"/>
           </a:p>
@@ -6837,7 +6841,7 @@
           <a:p>
             <a:fld id="{BDD2585B-0C3F-E94A-B774-0A46A528480F}" type="datetimeFigureOut">
               <a:rPr lang="en-ES" smtClean="0"/>
-              <a:t>15/9/25</a:t>
+              <a:t>9/30/25</a:t>
             </a:fld>
             <a:endParaRPr lang="en-ES"/>
           </a:p>
@@ -6891,7 +6895,7 @@
           <a:p>
             <a:fld id="{4495FFAA-CA92-8C49-8FEF-6F491738F4F9}" type="slidenum">
               <a:rPr lang="en-ES" smtClean="0"/>
-              <a:t>‹#›</a:t>
+              <a:t>‹Nº›</a:t>
             </a:fld>
             <a:endParaRPr lang="en-ES"/>
           </a:p>
@@ -7037,7 +7041,7 @@
           <a:p>
             <a:fld id="{BDD2585B-0C3F-E94A-B774-0A46A528480F}" type="datetimeFigureOut">
               <a:rPr lang="en-ES" smtClean="0"/>
-              <a:t>15/9/25</a:t>
+              <a:t>9/30/25</a:t>
             </a:fld>
             <a:endParaRPr lang="en-ES"/>
           </a:p>
@@ -7091,7 +7095,7 @@
           <a:p>
             <a:fld id="{4495FFAA-CA92-8C49-8FEF-6F491738F4F9}" type="slidenum">
               <a:rPr lang="en-ES" smtClean="0"/>
-              <a:t>‹#›</a:t>
+              <a:t>‹Nº›</a:t>
             </a:fld>
             <a:endParaRPr lang="en-ES"/>
           </a:p>
@@ -7313,7 +7317,7 @@
           <a:p>
             <a:fld id="{BDD2585B-0C3F-E94A-B774-0A46A528480F}" type="datetimeFigureOut">
               <a:rPr lang="en-ES" smtClean="0"/>
-              <a:t>15/9/25</a:t>
+              <a:t>9/30/25</a:t>
             </a:fld>
             <a:endParaRPr lang="en-ES"/>
           </a:p>
@@ -7367,7 +7371,7 @@
           <a:p>
             <a:fld id="{4495FFAA-CA92-8C49-8FEF-6F491738F4F9}" type="slidenum">
               <a:rPr lang="en-ES" smtClean="0"/>
-              <a:t>‹#›</a:t>
+              <a:t>‹Nº›</a:t>
             </a:fld>
             <a:endParaRPr lang="en-ES"/>
           </a:p>
@@ -7581,7 +7585,7 @@
           <a:p>
             <a:fld id="{BDD2585B-0C3F-E94A-B774-0A46A528480F}" type="datetimeFigureOut">
               <a:rPr lang="en-ES" smtClean="0"/>
-              <a:t>15/9/25</a:t>
+              <a:t>9/30/25</a:t>
             </a:fld>
             <a:endParaRPr lang="en-ES"/>
           </a:p>
@@ -7635,7 +7639,7 @@
           <a:p>
             <a:fld id="{4495FFAA-CA92-8C49-8FEF-6F491738F4F9}" type="slidenum">
               <a:rPr lang="en-ES" smtClean="0"/>
-              <a:t>‹#›</a:t>
+              <a:t>‹Nº›</a:t>
             </a:fld>
             <a:endParaRPr lang="en-ES"/>
           </a:p>
@@ -7996,7 +8000,7 @@
           <a:p>
             <a:fld id="{BDD2585B-0C3F-E94A-B774-0A46A528480F}" type="datetimeFigureOut">
               <a:rPr lang="en-ES" smtClean="0"/>
-              <a:t>15/9/25</a:t>
+              <a:t>9/30/25</a:t>
             </a:fld>
             <a:endParaRPr lang="en-ES"/>
           </a:p>
@@ -8050,7 +8054,7 @@
           <a:p>
             <a:fld id="{4495FFAA-CA92-8C49-8FEF-6F491738F4F9}" type="slidenum">
               <a:rPr lang="en-ES" smtClean="0"/>
-              <a:t>‹#›</a:t>
+              <a:t>‹Nº›</a:t>
             </a:fld>
             <a:endParaRPr lang="en-ES"/>
           </a:p>
@@ -8138,7 +8142,7 @@
           <a:p>
             <a:fld id="{BDD2585B-0C3F-E94A-B774-0A46A528480F}" type="datetimeFigureOut">
               <a:rPr lang="en-ES" smtClean="0"/>
-              <a:t>15/9/25</a:t>
+              <a:t>9/30/25</a:t>
             </a:fld>
             <a:endParaRPr lang="en-ES"/>
           </a:p>
@@ -8192,7 +8196,7 @@
           <a:p>
             <a:fld id="{4495FFAA-CA92-8C49-8FEF-6F491738F4F9}" type="slidenum">
               <a:rPr lang="en-ES" smtClean="0"/>
-              <a:t>‹#›</a:t>
+              <a:t>‹Nº›</a:t>
             </a:fld>
             <a:endParaRPr lang="en-ES"/>
           </a:p>
@@ -8251,7 +8255,7 @@
           <a:p>
             <a:fld id="{BDD2585B-0C3F-E94A-B774-0A46A528480F}" type="datetimeFigureOut">
               <a:rPr lang="en-ES" smtClean="0"/>
-              <a:t>15/9/25</a:t>
+              <a:t>9/30/25</a:t>
             </a:fld>
             <a:endParaRPr lang="en-ES"/>
           </a:p>
@@ -8305,7 +8309,7 @@
           <a:p>
             <a:fld id="{4495FFAA-CA92-8C49-8FEF-6F491738F4F9}" type="slidenum">
               <a:rPr lang="en-ES" smtClean="0"/>
-              <a:t>‹#›</a:t>
+              <a:t>‹Nº›</a:t>
             </a:fld>
             <a:endParaRPr lang="en-ES"/>
           </a:p>
@@ -8564,7 +8568,7 @@
           <a:p>
             <a:fld id="{BDD2585B-0C3F-E94A-B774-0A46A528480F}" type="datetimeFigureOut">
               <a:rPr lang="en-ES" smtClean="0"/>
-              <a:t>15/9/25</a:t>
+              <a:t>9/30/25</a:t>
             </a:fld>
             <a:endParaRPr lang="en-ES"/>
           </a:p>
@@ -8618,7 +8622,7 @@
           <a:p>
             <a:fld id="{4495FFAA-CA92-8C49-8FEF-6F491738F4F9}" type="slidenum">
               <a:rPr lang="en-ES" smtClean="0"/>
-              <a:t>‹#›</a:t>
+              <a:t>‹Nº›</a:t>
             </a:fld>
             <a:endParaRPr lang="en-ES"/>
           </a:p>
@@ -8853,7 +8857,7 @@
           <a:p>
             <a:fld id="{BDD2585B-0C3F-E94A-B774-0A46A528480F}" type="datetimeFigureOut">
               <a:rPr lang="en-ES" smtClean="0"/>
-              <a:t>15/9/25</a:t>
+              <a:t>9/30/25</a:t>
             </a:fld>
             <a:endParaRPr lang="en-ES"/>
           </a:p>
@@ -8907,7 +8911,7 @@
           <a:p>
             <a:fld id="{4495FFAA-CA92-8C49-8FEF-6F491738F4F9}" type="slidenum">
               <a:rPr lang="en-ES" smtClean="0"/>
-              <a:t>‹#›</a:t>
+              <a:t>‹Nº›</a:t>
             </a:fld>
             <a:endParaRPr lang="en-ES"/>
           </a:p>
@@ -9096,7 +9100,7 @@
           <a:p>
             <a:fld id="{BDD2585B-0C3F-E94A-B774-0A46A528480F}" type="datetimeFigureOut">
               <a:rPr lang="en-ES" smtClean="0"/>
-              <a:t>15/9/25</a:t>
+              <a:t>9/30/25</a:t>
             </a:fld>
             <a:endParaRPr lang="en-ES"/>
           </a:p>
@@ -9186,7 +9190,7 @@
           <a:p>
             <a:fld id="{4495FFAA-CA92-8C49-8FEF-6F491738F4F9}" type="slidenum">
               <a:rPr lang="en-ES" smtClean="0"/>
-              <a:t>‹#›</a:t>
+              <a:t>‹Nº›</a:t>
             </a:fld>
             <a:endParaRPr lang="en-ES"/>
           </a:p>
@@ -9497,6 +9501,72 @@
 </file>
 
 <file path=ppt/slides/slide1.xml><?xml version="1.0" encoding="utf-8"?>
+<p:sld xmlns:a="http://schemas.openxmlformats.org/drawingml/2006/main" xmlns:r="http://schemas.openxmlformats.org/officeDocument/2006/relationships" xmlns:p="http://schemas.openxmlformats.org/presentationml/2006/main">
+  <p:cSld>
+    <p:spTree>
+      <p:nvGrpSpPr>
+        <p:cNvPr id="1" name=""/>
+        <p:cNvGrpSpPr/>
+        <p:nvPr/>
+      </p:nvGrpSpPr>
+      <p:grpSpPr>
+        <a:xfrm>
+          <a:off x="0" y="0"/>
+          <a:ext cx="0" cy="0"/>
+          <a:chOff x="0" y="0"/>
+          <a:chExt cx="0" cy="0"/>
+        </a:xfrm>
+      </p:grpSpPr>
+      <p:sp>
+        <p:nvSpPr>
+          <p:cNvPr id="2" name="CuadroTexto 1">
+            <a:extLst>
+              <a:ext uri="{FF2B5EF4-FFF2-40B4-BE49-F238E27FC236}">
+                <a16:creationId xmlns:a16="http://schemas.microsoft.com/office/drawing/2014/main" id="{95BAAFC1-A4EB-5D34-4F83-BF2148E923D3}"/>
+              </a:ext>
+            </a:extLst>
+          </p:cNvPr>
+          <p:cNvSpPr txBox="1"/>
+          <p:nvPr/>
+        </p:nvSpPr>
+        <p:spPr>
+          <a:xfrm>
+            <a:off x="1780784" y="2192055"/>
+            <a:ext cx="8630432" cy="1754326"/>
+          </a:xfrm>
+          <a:prstGeom prst="rect">
+            <a:avLst/>
+          </a:prstGeom>
+          <a:noFill/>
+        </p:spPr>
+        <p:txBody>
+          <a:bodyPr wrap="square" rtlCol="0">
+            <a:spAutoFit/>
+          </a:bodyPr>
+          <a:lstStyle/>
+          <a:p>
+            <a:pPr algn="ctr"/>
+            <a:r>
+              <a:rPr lang="es-ES" sz="3600" b="1" dirty="0"/>
+              <a:t>Fundamentos teóricos de las técnicas de explotación de poblaciones biológicas</a:t>
+            </a:r>
+          </a:p>
+        </p:txBody>
+      </p:sp>
+    </p:spTree>
+    <p:extLst>
+      <p:ext uri="{BB962C8B-B14F-4D97-AF65-F5344CB8AC3E}">
+        <p14:creationId xmlns:p14="http://schemas.microsoft.com/office/powerpoint/2010/main" val="2035704078"/>
+      </p:ext>
+    </p:extLst>
+  </p:cSld>
+  <p:clrMapOvr>
+    <a:masterClrMapping/>
+  </p:clrMapOvr>
+</p:sld>
+</file>
+
+<file path=ppt/slides/slide2.xml><?xml version="1.0" encoding="utf-8"?>
 <p:sld xmlns:a="http://schemas.openxmlformats.org/drawingml/2006/main" xmlns:r="http://schemas.openxmlformats.org/officeDocument/2006/relationships" xmlns:p="http://schemas.openxmlformats.org/presentationml/2006/main">
   <p:cSld>
     <p:spTree>
@@ -10894,14 +10964,6 @@
   <p:clrMapOvr>
     <a:masterClrMapping/>
   </p:clrMapOvr>
-  <mc:AlternateContent xmlns:mc="http://schemas.openxmlformats.org/markup-compatibility/2006" xmlns:p14="http://schemas.microsoft.com/office/powerpoint/2010/main">
-    <mc:Choice Requires="p14">
-      <p:transition spd="slow" p14:dur="2000" advTm="13006"/>
-    </mc:Choice>
-    <mc:Fallback xmlns="">
-      <p:transition spd="slow" advTm="13006"/>
-    </mc:Fallback>
-  </mc:AlternateContent>
   <p:timing>
     <p:tnLst>
       <p:par>
@@ -11711,7 +11773,7 @@
 </p:sld>
 </file>
 
-<file path=ppt/slides/slide2.xml><?xml version="1.0" encoding="utf-8"?>
+<file path=ppt/slides/slide3.xml><?xml version="1.0" encoding="utf-8"?>
 <p:sld xmlns:a="http://schemas.openxmlformats.org/drawingml/2006/main" xmlns:r="http://schemas.openxmlformats.org/officeDocument/2006/relationships" xmlns:p="http://schemas.openxmlformats.org/presentationml/2006/main">
   <p:cSld>
     <p:spTree>
@@ -12755,417 +12817,6 @@
       </p:grpSp>
       <p:grpSp>
         <p:nvGrpSpPr>
-          <p:cNvPr id="49" name="Group 48">
-            <a:extLst>
-              <a:ext uri="{FF2B5EF4-FFF2-40B4-BE49-F238E27FC236}">
-                <a16:creationId xmlns:a16="http://schemas.microsoft.com/office/drawing/2014/main" id="{3C17A07A-A5CB-70E5-BA71-1AC0C511205C}"/>
-              </a:ext>
-            </a:extLst>
-          </p:cNvPr>
-          <p:cNvGrpSpPr/>
-          <p:nvPr/>
-        </p:nvGrpSpPr>
-        <p:grpSpPr>
-          <a:xfrm>
-            <a:off x="4972537" y="543753"/>
-            <a:ext cx="1084590" cy="1023146"/>
-            <a:chOff x="4972537" y="543753"/>
-            <a:chExt cx="1084590" cy="1023146"/>
-          </a:xfrm>
-        </p:grpSpPr>
-        <p:grpSp>
-          <p:nvGrpSpPr>
-            <p:cNvPr id="52" name="Group 51">
-              <a:extLst>
-                <a:ext uri="{FF2B5EF4-FFF2-40B4-BE49-F238E27FC236}">
-                  <a16:creationId xmlns:a16="http://schemas.microsoft.com/office/drawing/2014/main" id="{53945E5C-8824-EB90-171C-FA9B90E64CE0}"/>
-                </a:ext>
-              </a:extLst>
-            </p:cNvPr>
-            <p:cNvGrpSpPr/>
-            <p:nvPr/>
-          </p:nvGrpSpPr>
-          <p:grpSpPr>
-            <a:xfrm>
-              <a:off x="4972537" y="543753"/>
-              <a:ext cx="1084590" cy="1023146"/>
-              <a:chOff x="4972537" y="543753"/>
-              <a:chExt cx="1084590" cy="1023146"/>
-            </a:xfrm>
-          </p:grpSpPr>
-          <p:sp>
-            <p:nvSpPr>
-              <p:cNvPr id="31" name="Oval 30">
-                <a:extLst>
-                  <a:ext uri="{FF2B5EF4-FFF2-40B4-BE49-F238E27FC236}">
-                    <a16:creationId xmlns:a16="http://schemas.microsoft.com/office/drawing/2014/main" id="{79559B8E-48EC-62F8-051D-6B257A0E484A}"/>
-                  </a:ext>
-                </a:extLst>
-              </p:cNvPr>
-              <p:cNvSpPr/>
-              <p:nvPr/>
-            </p:nvSpPr>
-            <p:spPr>
-              <a:xfrm>
-                <a:off x="5107216" y="616988"/>
-                <a:ext cx="949911" cy="949911"/>
-              </a:xfrm>
-              <a:prstGeom prst="ellipse">
-                <a:avLst/>
-              </a:prstGeom>
-              <a:noFill/>
-              <a:ln>
-                <a:solidFill>
-                  <a:schemeClr val="tx1"/>
-                </a:solidFill>
-              </a:ln>
-            </p:spPr>
-            <p:style>
-              <a:lnRef idx="2">
-                <a:schemeClr val="accent1">
-                  <a:shade val="15000"/>
-                </a:schemeClr>
-              </a:lnRef>
-              <a:fillRef idx="1">
-                <a:schemeClr val="accent1"/>
-              </a:fillRef>
-              <a:effectRef idx="0">
-                <a:schemeClr val="accent1"/>
-              </a:effectRef>
-              <a:fontRef idx="minor">
-                <a:schemeClr val="lt1"/>
-              </a:fontRef>
-            </p:style>
-            <p:txBody>
-              <a:bodyPr rtlCol="0" anchor="ctr"/>
-              <a:lstStyle/>
-              <a:p>
-                <a:pPr algn="ctr"/>
-                <a:endParaRPr lang="en-ES"/>
-              </a:p>
-            </p:txBody>
-          </p:sp>
-          <p:pic>
-            <p:nvPicPr>
-              <p:cNvPr id="32" name="Graphic 31" descr="Fish with solid fill">
-                <a:extLst>
-                  <a:ext uri="{FF2B5EF4-FFF2-40B4-BE49-F238E27FC236}">
-                    <a16:creationId xmlns:a16="http://schemas.microsoft.com/office/drawing/2014/main" id="{3DE1C031-D362-BC32-C0DE-BA62995D7FB2}"/>
-                  </a:ext>
-                </a:extLst>
-              </p:cNvPr>
-              <p:cNvPicPr>
-                <a:picLocks noChangeAspect="1"/>
-              </p:cNvPicPr>
-              <p:nvPr/>
-            </p:nvPicPr>
-            <p:blipFill>
-              <a:blip r:embed="rId3">
-                <a:extLst>
-                  <a:ext uri="{96DAC541-7B7A-43D3-8B79-37D633B846F1}">
-                    <asvg:svgBlip xmlns:asvg="http://schemas.microsoft.com/office/drawing/2016/SVG/main" r:embed="rId4"/>
-                  </a:ext>
-                </a:extLst>
-              </a:blip>
-              <a:stretch>
-                <a:fillRect/>
-              </a:stretch>
-            </p:blipFill>
-            <p:spPr>
-              <a:xfrm>
-                <a:off x="5395319" y="1128849"/>
-                <a:ext cx="437528" cy="437528"/>
-              </a:xfrm>
-              <a:prstGeom prst="rect">
-                <a:avLst/>
-              </a:prstGeom>
-            </p:spPr>
-          </p:pic>
-          <p:pic>
-            <p:nvPicPr>
-              <p:cNvPr id="33" name="Graphic 32" descr="Fish with solid fill">
-                <a:extLst>
-                  <a:ext uri="{FF2B5EF4-FFF2-40B4-BE49-F238E27FC236}">
-                    <a16:creationId xmlns:a16="http://schemas.microsoft.com/office/drawing/2014/main" id="{4ECAD00B-A839-DFC1-623C-90C3E1C1690B}"/>
-                  </a:ext>
-                </a:extLst>
-              </p:cNvPr>
-              <p:cNvPicPr>
-                <a:picLocks noChangeAspect="1"/>
-              </p:cNvPicPr>
-              <p:nvPr/>
-            </p:nvPicPr>
-            <p:blipFill>
-              <a:blip r:embed="rId3">
-                <a:extLst>
-                  <a:ext uri="{96DAC541-7B7A-43D3-8B79-37D633B846F1}">
-                    <asvg:svgBlip xmlns:asvg="http://schemas.microsoft.com/office/drawing/2016/SVG/main" r:embed="rId4"/>
-                  </a:ext>
-                </a:extLst>
-              </a:blip>
-              <a:stretch>
-                <a:fillRect/>
-              </a:stretch>
-            </p:blipFill>
-            <p:spPr>
-              <a:xfrm>
-                <a:off x="5188406" y="973679"/>
-                <a:ext cx="437527" cy="437527"/>
-              </a:xfrm>
-              <a:prstGeom prst="rect">
-                <a:avLst/>
-              </a:prstGeom>
-            </p:spPr>
-          </p:pic>
-          <p:pic>
-            <p:nvPicPr>
-              <p:cNvPr id="34" name="Graphic 33" descr="Fish with solid fill">
-                <a:extLst>
-                  <a:ext uri="{FF2B5EF4-FFF2-40B4-BE49-F238E27FC236}">
-                    <a16:creationId xmlns:a16="http://schemas.microsoft.com/office/drawing/2014/main" id="{19C7E73A-6145-71A9-3955-27BD25899A12}"/>
-                  </a:ext>
-                </a:extLst>
-              </p:cNvPr>
-              <p:cNvPicPr>
-                <a:picLocks noChangeAspect="1"/>
-              </p:cNvPicPr>
-              <p:nvPr/>
-            </p:nvPicPr>
-            <p:blipFill>
-              <a:blip r:embed="rId3">
-                <a:extLst>
-                  <a:ext uri="{96DAC541-7B7A-43D3-8B79-37D633B846F1}">
-                    <asvg:svgBlip xmlns:asvg="http://schemas.microsoft.com/office/drawing/2016/SVG/main" r:embed="rId4"/>
-                  </a:ext>
-                </a:extLst>
-              </a:blip>
-              <a:stretch>
-                <a:fillRect/>
-              </a:stretch>
-            </p:blipFill>
-            <p:spPr>
-              <a:xfrm>
-                <a:off x="5172003" y="737203"/>
-                <a:ext cx="354740" cy="354740"/>
-              </a:xfrm>
-              <a:prstGeom prst="rect">
-                <a:avLst/>
-              </a:prstGeom>
-            </p:spPr>
-          </p:pic>
-          <p:pic>
-            <p:nvPicPr>
-              <p:cNvPr id="35" name="Graphic 34" descr="Fish with solid fill">
-                <a:extLst>
-                  <a:ext uri="{FF2B5EF4-FFF2-40B4-BE49-F238E27FC236}">
-                    <a16:creationId xmlns:a16="http://schemas.microsoft.com/office/drawing/2014/main" id="{77FECAC2-C794-B1C3-774A-5D5E443B5C0F}"/>
-                  </a:ext>
-                </a:extLst>
-              </p:cNvPr>
-              <p:cNvPicPr>
-                <a:picLocks noChangeAspect="1"/>
-              </p:cNvPicPr>
-              <p:nvPr/>
-            </p:nvPicPr>
-            <p:blipFill>
-              <a:blip r:embed="rId3">
-                <a:extLst>
-                  <a:ext uri="{96DAC541-7B7A-43D3-8B79-37D633B846F1}">
-                    <asvg:svgBlip xmlns:asvg="http://schemas.microsoft.com/office/drawing/2016/SVG/main" r:embed="rId4"/>
-                  </a:ext>
-                </a:extLst>
-              </a:blip>
-              <a:stretch>
-                <a:fillRect/>
-              </a:stretch>
-            </p:blipFill>
-            <p:spPr>
-              <a:xfrm>
-                <a:off x="5546461" y="770727"/>
-                <a:ext cx="368998" cy="368998"/>
-              </a:xfrm>
-              <a:prstGeom prst="rect">
-                <a:avLst/>
-              </a:prstGeom>
-            </p:spPr>
-          </p:pic>
-          <p:pic>
-            <p:nvPicPr>
-              <p:cNvPr id="36" name="Graphic 35" descr="Fish with solid fill">
-                <a:extLst>
-                  <a:ext uri="{FF2B5EF4-FFF2-40B4-BE49-F238E27FC236}">
-                    <a16:creationId xmlns:a16="http://schemas.microsoft.com/office/drawing/2014/main" id="{A9A93307-A3FD-203D-0C9E-1438806BE809}"/>
-                  </a:ext>
-                </a:extLst>
-              </p:cNvPr>
-              <p:cNvPicPr>
-                <a:picLocks noChangeAspect="1"/>
-              </p:cNvPicPr>
-              <p:nvPr/>
-            </p:nvPicPr>
-            <p:blipFill>
-              <a:blip r:embed="rId3">
-                <a:extLst>
-                  <a:ext uri="{96DAC541-7B7A-43D3-8B79-37D633B846F1}">
-                    <asvg:svgBlip xmlns:asvg="http://schemas.microsoft.com/office/drawing/2016/SVG/main" r:embed="rId4"/>
-                  </a:ext>
-                </a:extLst>
-              </a:blip>
-              <a:stretch>
-                <a:fillRect/>
-              </a:stretch>
-            </p:blipFill>
-            <p:spPr>
-              <a:xfrm flipH="1">
-                <a:off x="5574775" y="903293"/>
-                <a:ext cx="437528" cy="437528"/>
-              </a:xfrm>
-              <a:prstGeom prst="rect">
-                <a:avLst/>
-              </a:prstGeom>
-            </p:spPr>
-          </p:pic>
-          <p:pic>
-            <p:nvPicPr>
-              <p:cNvPr id="37" name="Graphic 36" descr="Fish with solid fill">
-                <a:extLst>
-                  <a:ext uri="{FF2B5EF4-FFF2-40B4-BE49-F238E27FC236}">
-                    <a16:creationId xmlns:a16="http://schemas.microsoft.com/office/drawing/2014/main" id="{15996DDC-BEA5-D9F8-EF1D-6A2AB5878694}"/>
-                  </a:ext>
-                </a:extLst>
-              </p:cNvPr>
-              <p:cNvPicPr>
-                <a:picLocks noChangeAspect="1"/>
-              </p:cNvPicPr>
-              <p:nvPr/>
-            </p:nvPicPr>
-            <p:blipFill>
-              <a:blip r:embed="rId3">
-                <a:extLst>
-                  <a:ext uri="{96DAC541-7B7A-43D3-8B79-37D633B846F1}">
-                    <asvg:svgBlip xmlns:asvg="http://schemas.microsoft.com/office/drawing/2016/SVG/main" r:embed="rId4"/>
-                  </a:ext>
-                </a:extLst>
-              </a:blip>
-              <a:stretch>
-                <a:fillRect/>
-              </a:stretch>
-            </p:blipFill>
-            <p:spPr>
-              <a:xfrm>
-                <a:off x="5511110" y="637134"/>
-                <a:ext cx="246014" cy="246014"/>
-              </a:xfrm>
-              <a:prstGeom prst="rect">
-                <a:avLst/>
-              </a:prstGeom>
-            </p:spPr>
-          </p:pic>
-          <p:cxnSp>
-            <p:nvCxnSpPr>
-              <p:cNvPr id="47" name="Straight Arrow Connector 46">
-                <a:extLst>
-                  <a:ext uri="{FF2B5EF4-FFF2-40B4-BE49-F238E27FC236}">
-                    <a16:creationId xmlns:a16="http://schemas.microsoft.com/office/drawing/2014/main" id="{8101BD87-755A-7CF2-A3A7-3D930B565337}"/>
-                  </a:ext>
-                </a:extLst>
-              </p:cNvPr>
-              <p:cNvCxnSpPr>
-                <a:cxnSpLocks/>
-                <a:stCxn id="31" idx="1"/>
-                <a:endCxn id="14" idx="8"/>
-              </p:cNvCxnSpPr>
-              <p:nvPr/>
-            </p:nvCxnSpPr>
-            <p:spPr>
-              <a:xfrm flipH="1" flipV="1">
-                <a:off x="4972537" y="543753"/>
-                <a:ext cx="273790" cy="212346"/>
-              </a:xfrm>
-              <a:prstGeom prst="straightConnector1">
-                <a:avLst/>
-              </a:prstGeom>
-              <a:ln>
-                <a:solidFill>
-                  <a:schemeClr val="tx1"/>
-                </a:solidFill>
-                <a:tailEnd type="triangle"/>
-              </a:ln>
-            </p:spPr>
-            <p:style>
-              <a:lnRef idx="2">
-                <a:schemeClr val="accent1"/>
-              </a:lnRef>
-              <a:fillRef idx="0">
-                <a:schemeClr val="accent1"/>
-              </a:fillRef>
-              <a:effectRef idx="1">
-                <a:schemeClr val="accent1"/>
-              </a:effectRef>
-              <a:fontRef idx="minor">
-                <a:schemeClr val="tx1"/>
-              </a:fontRef>
-            </p:style>
-          </p:cxnSp>
-        </p:grpSp>
-        <p:sp>
-          <p:nvSpPr>
-            <p:cNvPr id="15" name="Oval 14">
-              <a:extLst>
-                <a:ext uri="{FF2B5EF4-FFF2-40B4-BE49-F238E27FC236}">
-                  <a16:creationId xmlns:a16="http://schemas.microsoft.com/office/drawing/2014/main" id="{FB74E032-13BA-49D5-A198-6ACD301E4B7D}"/>
-                </a:ext>
-              </a:extLst>
-            </p:cNvPr>
-            <p:cNvSpPr/>
-            <p:nvPr/>
-          </p:nvSpPr>
-          <p:spPr>
-            <a:xfrm>
-              <a:off x="5149587" y="1351059"/>
-              <a:ext cx="210897" cy="210897"/>
-            </a:xfrm>
-            <a:prstGeom prst="ellipse">
-              <a:avLst/>
-            </a:prstGeom>
-            <a:solidFill>
-              <a:schemeClr val="tx1"/>
-            </a:solidFill>
-            <a:ln>
-              <a:noFill/>
-            </a:ln>
-          </p:spPr>
-          <p:style>
-            <a:lnRef idx="2">
-              <a:schemeClr val="accent1">
-                <a:shade val="15000"/>
-              </a:schemeClr>
-            </a:lnRef>
-            <a:fillRef idx="1">
-              <a:schemeClr val="accent1"/>
-            </a:fillRef>
-            <a:effectRef idx="0">
-              <a:schemeClr val="accent1"/>
-            </a:effectRef>
-            <a:fontRef idx="minor">
-              <a:schemeClr val="lt1"/>
-            </a:fontRef>
-          </p:style>
-          <p:txBody>
-            <a:bodyPr rtlCol="0" anchor="ctr"/>
-            <a:lstStyle/>
-            <a:p>
-              <a:pPr algn="ctr"/>
-              <a:r>
-                <a:rPr lang="en-ES" sz="1200" b="1" dirty="0"/>
-                <a:t>2</a:t>
-              </a:r>
-            </a:p>
-          </p:txBody>
-        </p:sp>
-      </p:grpSp>
-      <p:grpSp>
-        <p:nvGrpSpPr>
           <p:cNvPr id="57" name="Group 56">
             <a:extLst>
               <a:ext uri="{FF2B5EF4-FFF2-40B4-BE49-F238E27FC236}">
@@ -14065,6 +13716,416 @@
           </p:sp>
         </mc:Fallback>
       </mc:AlternateContent>
+      <p:grpSp>
+        <p:nvGrpSpPr>
+          <p:cNvPr id="6" name="Group 48">
+            <a:extLst>
+              <a:ext uri="{FF2B5EF4-FFF2-40B4-BE49-F238E27FC236}">
+                <a16:creationId xmlns:a16="http://schemas.microsoft.com/office/drawing/2014/main" id="{8D6B4A48-9F09-54F8-E333-206C654318BB}"/>
+              </a:ext>
+            </a:extLst>
+          </p:cNvPr>
+          <p:cNvGrpSpPr/>
+          <p:nvPr/>
+        </p:nvGrpSpPr>
+        <p:grpSpPr>
+          <a:xfrm>
+            <a:off x="3328443" y="503656"/>
+            <a:ext cx="1285709" cy="949911"/>
+            <a:chOff x="5107216" y="616988"/>
+            <a:chExt cx="1285709" cy="949911"/>
+          </a:xfrm>
+        </p:grpSpPr>
+        <p:grpSp>
+          <p:nvGrpSpPr>
+            <p:cNvPr id="10" name="Group 51">
+              <a:extLst>
+                <a:ext uri="{FF2B5EF4-FFF2-40B4-BE49-F238E27FC236}">
+                  <a16:creationId xmlns:a16="http://schemas.microsoft.com/office/drawing/2014/main" id="{FE7FEC59-3EDE-2B38-A463-072B40223BCC}"/>
+                </a:ext>
+              </a:extLst>
+            </p:cNvPr>
+            <p:cNvGrpSpPr/>
+            <p:nvPr/>
+          </p:nvGrpSpPr>
+          <p:grpSpPr>
+            <a:xfrm>
+              <a:off x="5107216" y="616988"/>
+              <a:ext cx="1285709" cy="949911"/>
+              <a:chOff x="5107216" y="616988"/>
+              <a:chExt cx="1285709" cy="949911"/>
+            </a:xfrm>
+          </p:grpSpPr>
+          <p:sp>
+            <p:nvSpPr>
+              <p:cNvPr id="13" name="Oval 30">
+                <a:extLst>
+                  <a:ext uri="{FF2B5EF4-FFF2-40B4-BE49-F238E27FC236}">
+                    <a16:creationId xmlns:a16="http://schemas.microsoft.com/office/drawing/2014/main" id="{566B195B-8BE7-72B8-E0FB-FDB8717317C9}"/>
+                  </a:ext>
+                </a:extLst>
+              </p:cNvPr>
+              <p:cNvSpPr/>
+              <p:nvPr/>
+            </p:nvSpPr>
+            <p:spPr>
+              <a:xfrm>
+                <a:off x="5107216" y="616988"/>
+                <a:ext cx="949911" cy="949911"/>
+              </a:xfrm>
+              <a:prstGeom prst="ellipse">
+                <a:avLst/>
+              </a:prstGeom>
+              <a:noFill/>
+              <a:ln>
+                <a:solidFill>
+                  <a:schemeClr val="tx1"/>
+                </a:solidFill>
+              </a:ln>
+            </p:spPr>
+            <p:style>
+              <a:lnRef idx="2">
+                <a:schemeClr val="accent1">
+                  <a:shade val="15000"/>
+                </a:schemeClr>
+              </a:lnRef>
+              <a:fillRef idx="1">
+                <a:schemeClr val="accent1"/>
+              </a:fillRef>
+              <a:effectRef idx="0">
+                <a:schemeClr val="accent1"/>
+              </a:effectRef>
+              <a:fontRef idx="minor">
+                <a:schemeClr val="lt1"/>
+              </a:fontRef>
+            </p:style>
+            <p:txBody>
+              <a:bodyPr rtlCol="0" anchor="ctr"/>
+              <a:lstStyle/>
+              <a:p>
+                <a:pPr algn="ctr"/>
+                <a:endParaRPr lang="en-ES"/>
+              </a:p>
+            </p:txBody>
+          </p:sp>
+          <p:pic>
+            <p:nvPicPr>
+              <p:cNvPr id="16" name="Graphic 31" descr="Fish with solid fill">
+                <a:extLst>
+                  <a:ext uri="{FF2B5EF4-FFF2-40B4-BE49-F238E27FC236}">
+                    <a16:creationId xmlns:a16="http://schemas.microsoft.com/office/drawing/2014/main" id="{2DBF1E65-8551-B46E-96BE-3267CFB18C23}"/>
+                  </a:ext>
+                </a:extLst>
+              </p:cNvPr>
+              <p:cNvPicPr>
+                <a:picLocks noChangeAspect="1"/>
+              </p:cNvPicPr>
+              <p:nvPr/>
+            </p:nvPicPr>
+            <p:blipFill>
+              <a:blip r:embed="rId3">
+                <a:extLst>
+                  <a:ext uri="{96DAC541-7B7A-43D3-8B79-37D633B846F1}">
+                    <asvg:svgBlip xmlns:asvg="http://schemas.microsoft.com/office/drawing/2016/SVG/main" r:embed="rId4"/>
+                  </a:ext>
+                </a:extLst>
+              </a:blip>
+              <a:stretch>
+                <a:fillRect/>
+              </a:stretch>
+            </p:blipFill>
+            <p:spPr>
+              <a:xfrm>
+                <a:off x="5395319" y="1128849"/>
+                <a:ext cx="437528" cy="437528"/>
+              </a:xfrm>
+              <a:prstGeom prst="rect">
+                <a:avLst/>
+              </a:prstGeom>
+            </p:spPr>
+          </p:pic>
+          <p:pic>
+            <p:nvPicPr>
+              <p:cNvPr id="20" name="Graphic 32" descr="Fish with solid fill">
+                <a:extLst>
+                  <a:ext uri="{FF2B5EF4-FFF2-40B4-BE49-F238E27FC236}">
+                    <a16:creationId xmlns:a16="http://schemas.microsoft.com/office/drawing/2014/main" id="{794E144C-36B8-1848-F09C-4AF4334955AD}"/>
+                  </a:ext>
+                </a:extLst>
+              </p:cNvPr>
+              <p:cNvPicPr>
+                <a:picLocks noChangeAspect="1"/>
+              </p:cNvPicPr>
+              <p:nvPr/>
+            </p:nvPicPr>
+            <p:blipFill>
+              <a:blip r:embed="rId3">
+                <a:extLst>
+                  <a:ext uri="{96DAC541-7B7A-43D3-8B79-37D633B846F1}">
+                    <asvg:svgBlip xmlns:asvg="http://schemas.microsoft.com/office/drawing/2016/SVG/main" r:embed="rId4"/>
+                  </a:ext>
+                </a:extLst>
+              </a:blip>
+              <a:stretch>
+                <a:fillRect/>
+              </a:stretch>
+            </p:blipFill>
+            <p:spPr>
+              <a:xfrm>
+                <a:off x="5188406" y="973679"/>
+                <a:ext cx="437527" cy="437527"/>
+              </a:xfrm>
+              <a:prstGeom prst="rect">
+                <a:avLst/>
+              </a:prstGeom>
+            </p:spPr>
+          </p:pic>
+          <p:pic>
+            <p:nvPicPr>
+              <p:cNvPr id="21" name="Graphic 33" descr="Fish with solid fill">
+                <a:extLst>
+                  <a:ext uri="{FF2B5EF4-FFF2-40B4-BE49-F238E27FC236}">
+                    <a16:creationId xmlns:a16="http://schemas.microsoft.com/office/drawing/2014/main" id="{737A879B-D081-4227-7B91-77D2398093E8}"/>
+                  </a:ext>
+                </a:extLst>
+              </p:cNvPr>
+              <p:cNvPicPr>
+                <a:picLocks noChangeAspect="1"/>
+              </p:cNvPicPr>
+              <p:nvPr/>
+            </p:nvPicPr>
+            <p:blipFill>
+              <a:blip r:embed="rId3">
+                <a:extLst>
+                  <a:ext uri="{96DAC541-7B7A-43D3-8B79-37D633B846F1}">
+                    <asvg:svgBlip xmlns:asvg="http://schemas.microsoft.com/office/drawing/2016/SVG/main" r:embed="rId4"/>
+                  </a:ext>
+                </a:extLst>
+              </a:blip>
+              <a:stretch>
+                <a:fillRect/>
+              </a:stretch>
+            </p:blipFill>
+            <p:spPr>
+              <a:xfrm>
+                <a:off x="5172003" y="737203"/>
+                <a:ext cx="354740" cy="354740"/>
+              </a:xfrm>
+              <a:prstGeom prst="rect">
+                <a:avLst/>
+              </a:prstGeom>
+            </p:spPr>
+          </p:pic>
+          <p:pic>
+            <p:nvPicPr>
+              <p:cNvPr id="22" name="Graphic 34" descr="Fish with solid fill">
+                <a:extLst>
+                  <a:ext uri="{FF2B5EF4-FFF2-40B4-BE49-F238E27FC236}">
+                    <a16:creationId xmlns:a16="http://schemas.microsoft.com/office/drawing/2014/main" id="{69EFE205-576E-A614-2C95-74A5F0D9EC79}"/>
+                  </a:ext>
+                </a:extLst>
+              </p:cNvPr>
+              <p:cNvPicPr>
+                <a:picLocks noChangeAspect="1"/>
+              </p:cNvPicPr>
+              <p:nvPr/>
+            </p:nvPicPr>
+            <p:blipFill>
+              <a:blip r:embed="rId3">
+                <a:extLst>
+                  <a:ext uri="{96DAC541-7B7A-43D3-8B79-37D633B846F1}">
+                    <asvg:svgBlip xmlns:asvg="http://schemas.microsoft.com/office/drawing/2016/SVG/main" r:embed="rId4"/>
+                  </a:ext>
+                </a:extLst>
+              </a:blip>
+              <a:stretch>
+                <a:fillRect/>
+              </a:stretch>
+            </p:blipFill>
+            <p:spPr>
+              <a:xfrm>
+                <a:off x="5546461" y="770727"/>
+                <a:ext cx="368998" cy="368998"/>
+              </a:xfrm>
+              <a:prstGeom prst="rect">
+                <a:avLst/>
+              </a:prstGeom>
+            </p:spPr>
+          </p:pic>
+          <p:pic>
+            <p:nvPicPr>
+              <p:cNvPr id="24" name="Graphic 35" descr="Fish with solid fill">
+                <a:extLst>
+                  <a:ext uri="{FF2B5EF4-FFF2-40B4-BE49-F238E27FC236}">
+                    <a16:creationId xmlns:a16="http://schemas.microsoft.com/office/drawing/2014/main" id="{29721DD7-B5DC-5BE8-6039-ACB470244E53}"/>
+                  </a:ext>
+                </a:extLst>
+              </p:cNvPr>
+              <p:cNvPicPr>
+                <a:picLocks noChangeAspect="1"/>
+              </p:cNvPicPr>
+              <p:nvPr/>
+            </p:nvPicPr>
+            <p:blipFill>
+              <a:blip r:embed="rId3">
+                <a:extLst>
+                  <a:ext uri="{96DAC541-7B7A-43D3-8B79-37D633B846F1}">
+                    <asvg:svgBlip xmlns:asvg="http://schemas.microsoft.com/office/drawing/2016/SVG/main" r:embed="rId4"/>
+                  </a:ext>
+                </a:extLst>
+              </a:blip>
+              <a:stretch>
+                <a:fillRect/>
+              </a:stretch>
+            </p:blipFill>
+            <p:spPr>
+              <a:xfrm flipH="1">
+                <a:off x="5574775" y="903293"/>
+                <a:ext cx="437528" cy="437528"/>
+              </a:xfrm>
+              <a:prstGeom prst="rect">
+                <a:avLst/>
+              </a:prstGeom>
+            </p:spPr>
+          </p:pic>
+          <p:pic>
+            <p:nvPicPr>
+              <p:cNvPr id="27" name="Graphic 36" descr="Fish with solid fill">
+                <a:extLst>
+                  <a:ext uri="{FF2B5EF4-FFF2-40B4-BE49-F238E27FC236}">
+                    <a16:creationId xmlns:a16="http://schemas.microsoft.com/office/drawing/2014/main" id="{6B8A3984-C513-79B0-E794-A4493BE4424F}"/>
+                  </a:ext>
+                </a:extLst>
+              </p:cNvPr>
+              <p:cNvPicPr>
+                <a:picLocks noChangeAspect="1"/>
+              </p:cNvPicPr>
+              <p:nvPr/>
+            </p:nvPicPr>
+            <p:blipFill>
+              <a:blip r:embed="rId3">
+                <a:extLst>
+                  <a:ext uri="{96DAC541-7B7A-43D3-8B79-37D633B846F1}">
+                    <asvg:svgBlip xmlns:asvg="http://schemas.microsoft.com/office/drawing/2016/SVG/main" r:embed="rId4"/>
+                  </a:ext>
+                </a:extLst>
+              </a:blip>
+              <a:stretch>
+                <a:fillRect/>
+              </a:stretch>
+            </p:blipFill>
+            <p:spPr>
+              <a:xfrm>
+                <a:off x="5511110" y="637134"/>
+                <a:ext cx="246014" cy="246014"/>
+              </a:xfrm>
+              <a:prstGeom prst="rect">
+                <a:avLst/>
+              </a:prstGeom>
+            </p:spPr>
+          </p:pic>
+          <p:cxnSp>
+            <p:nvCxnSpPr>
+              <p:cNvPr id="30" name="Straight Arrow Connector 46">
+                <a:extLst>
+                  <a:ext uri="{FF2B5EF4-FFF2-40B4-BE49-F238E27FC236}">
+                    <a16:creationId xmlns:a16="http://schemas.microsoft.com/office/drawing/2014/main" id="{C6964C36-BC3B-2719-D9B2-003AAA68E009}"/>
+                  </a:ext>
+                </a:extLst>
+              </p:cNvPr>
+              <p:cNvCxnSpPr>
+                <a:cxnSpLocks/>
+                <a:stCxn id="13" idx="6"/>
+              </p:cNvCxnSpPr>
+              <p:nvPr/>
+            </p:nvCxnSpPr>
+            <p:spPr>
+              <a:xfrm flipV="1">
+                <a:off x="6057127" y="1019211"/>
+                <a:ext cx="335798" cy="72733"/>
+              </a:xfrm>
+              <a:prstGeom prst="straightConnector1">
+                <a:avLst/>
+              </a:prstGeom>
+              <a:ln>
+                <a:solidFill>
+                  <a:schemeClr val="tx1"/>
+                </a:solidFill>
+                <a:tailEnd type="triangle"/>
+              </a:ln>
+            </p:spPr>
+            <p:style>
+              <a:lnRef idx="2">
+                <a:schemeClr val="accent1"/>
+              </a:lnRef>
+              <a:fillRef idx="0">
+                <a:schemeClr val="accent1"/>
+              </a:fillRef>
+              <a:effectRef idx="1">
+                <a:schemeClr val="accent1"/>
+              </a:effectRef>
+              <a:fontRef idx="minor">
+                <a:schemeClr val="tx1"/>
+              </a:fontRef>
+            </p:style>
+          </p:cxnSp>
+        </p:grpSp>
+        <p:sp>
+          <p:nvSpPr>
+            <p:cNvPr id="11" name="Oval 14">
+              <a:extLst>
+                <a:ext uri="{FF2B5EF4-FFF2-40B4-BE49-F238E27FC236}">
+                  <a16:creationId xmlns:a16="http://schemas.microsoft.com/office/drawing/2014/main" id="{1C4ADA08-C085-5F46-1E99-6BFF5D9953FC}"/>
+                </a:ext>
+              </a:extLst>
+            </p:cNvPr>
+            <p:cNvSpPr/>
+            <p:nvPr/>
+          </p:nvSpPr>
+          <p:spPr>
+            <a:xfrm>
+              <a:off x="5149587" y="1351059"/>
+              <a:ext cx="210897" cy="210897"/>
+            </a:xfrm>
+            <a:prstGeom prst="ellipse">
+              <a:avLst/>
+            </a:prstGeom>
+            <a:solidFill>
+              <a:schemeClr val="tx1"/>
+            </a:solidFill>
+            <a:ln>
+              <a:noFill/>
+            </a:ln>
+          </p:spPr>
+          <p:style>
+            <a:lnRef idx="2">
+              <a:schemeClr val="accent1">
+                <a:shade val="15000"/>
+              </a:schemeClr>
+            </a:lnRef>
+            <a:fillRef idx="1">
+              <a:schemeClr val="accent1"/>
+            </a:fillRef>
+            <a:effectRef idx="0">
+              <a:schemeClr val="accent1"/>
+            </a:effectRef>
+            <a:fontRef idx="minor">
+              <a:schemeClr val="lt1"/>
+            </a:fontRef>
+          </p:style>
+          <p:txBody>
+            <a:bodyPr rtlCol="0" anchor="ctr"/>
+            <a:lstStyle/>
+            <a:p>
+              <a:pPr algn="ctr"/>
+              <a:r>
+                <a:rPr lang="en-ES" sz="1200" b="1" dirty="0"/>
+                <a:t>2</a:t>
+              </a:r>
+            </a:p>
+          </p:txBody>
+        </p:sp>
+      </p:grpSp>
     </p:spTree>
     <p:custDataLst>
       <p:tags r:id="rId1"/>
@@ -14078,14 +14139,6 @@
   <p:clrMapOvr>
     <a:masterClrMapping/>
   </p:clrMapOvr>
-  <mc:AlternateContent xmlns:mc="http://schemas.openxmlformats.org/markup-compatibility/2006" xmlns:p14="http://schemas.microsoft.com/office/powerpoint/2010/main">
-    <mc:Choice Requires="p14">
-      <p:transition spd="slow" p14:dur="2000" advTm="15780"/>
-    </mc:Choice>
-    <mc:Fallback xmlns="">
-      <p:transition spd="slow" advTm="15780"/>
-    </mc:Fallback>
-  </mc:AlternateContent>
   <p:timing>
     <p:tnLst>
       <p:par>
@@ -14210,7 +14263,7 @@
                                           </p:stCondLst>
                                         </p:cTn>
                                         <p:tgtEl>
-                                          <p:spTgt spid="49"/>
+                                          <p:spTgt spid="6"/>
                                         </p:tgtEl>
                                         <p:attrNameLst>
                                           <p:attrName>style.visibility</p:attrName>
@@ -14296,264 +14349,10 @@
       </p:par>
     </p:tnLst>
   </p:timing>
-  <p:extLst>
-    <p:ext uri="{3A86A75C-4F4B-4683-9AE1-C65F6400EC91}">
-      <p14:laserTraceLst xmlns:p14="http://schemas.microsoft.com/office/powerpoint/2010/main">
-        <p14:tracePtLst>
-          <p14:tracePt t="7484" x="4445000" y="6840538"/>
-          <p14:tracePt t="7499" x="4589463" y="6840538"/>
-          <p14:tracePt t="7512" x="4708525" y="6840538"/>
-          <p14:tracePt t="7530" x="4962525" y="6840538"/>
-          <p14:tracePt t="7886" x="5470525" y="6721475"/>
-          <p14:tracePt t="7896" x="5287963" y="6586538"/>
-          <p14:tracePt t="7913" x="5153025" y="6450013"/>
-          <p14:tracePt t="7930" x="5033963" y="6313488"/>
-          <p14:tracePt t="7947" x="4862513" y="6078538"/>
-          <p14:tracePt t="7963" x="4681538" y="5741988"/>
-          <p14:tracePt t="7980" x="4491038" y="5334000"/>
-          <p14:tracePt t="7996" x="4217988" y="4762500"/>
-          <p14:tracePt t="8014" x="4017963" y="4371975"/>
-          <p14:tracePt t="8030" x="3729038" y="3783013"/>
-          <p14:tracePt t="8033" x="3582988" y="3546475"/>
-          <p14:tracePt t="8046" x="3509963" y="3446463"/>
-          <p14:tracePt t="8063" x="3446463" y="3375025"/>
-          <p14:tracePt t="8079" x="3375025" y="3311525"/>
-          <p14:tracePt t="8096" x="3311525" y="3255963"/>
-          <p14:tracePt t="8113" x="3275013" y="3211513"/>
-          <p14:tracePt t="8146" x="3275013" y="3192463"/>
-          <p14:tracePt t="8171" x="3275013" y="3175000"/>
-          <p14:tracePt t="8180" x="3275013" y="3111500"/>
-          <p14:tracePt t="8197" x="3275013" y="3074988"/>
-          <p14:tracePt t="8213" x="3292475" y="3057525"/>
-          <p14:tracePt t="8229" x="3328988" y="3038475"/>
-          <p14:tracePt t="8247" x="3375025" y="2994025"/>
-          <p14:tracePt t="8262" x="3411538" y="2921000"/>
-          <p14:tracePt t="8280" x="3429000" y="2840038"/>
-          <p14:tracePt t="8296" x="3446463" y="2720975"/>
-          <p14:tracePt t="8313" x="3509963" y="2549525"/>
-          <p14:tracePt t="8329" x="3529013" y="2395538"/>
-          <p14:tracePt t="8347" x="3546475" y="2195513"/>
-          <p14:tracePt t="8363" x="3546475" y="2078038"/>
-          <p14:tracePt t="8380" x="3565525" y="1978025"/>
-          <p14:tracePt t="8397" x="3609975" y="1905000"/>
-          <p14:tracePt t="8412" x="3629025" y="1878013"/>
-          <p14:tracePt t="8430" x="3646488" y="1858963"/>
-          <p14:tracePt t="8445" x="3683000" y="1841500"/>
-          <p14:tracePt t="8464" x="3763963" y="1804988"/>
-          <p14:tracePt t="8479" x="3800475" y="1760538"/>
-          <p14:tracePt t="8496" x="3883025" y="1724025"/>
-          <p14:tracePt t="8512" x="3937000" y="1668463"/>
-          <p14:tracePt t="8529" x="4037013" y="1624013"/>
-          <p14:tracePt t="8546" x="4217988" y="1550988"/>
-          <p14:tracePt t="8563" x="4562475" y="1433513"/>
-          <p14:tracePt t="8580" x="4862513" y="1387475"/>
-          <p14:tracePt t="8596" x="5351463" y="1370013"/>
-          <p14:tracePt t="8614" x="5570538" y="1370013"/>
-          <p14:tracePt t="8629" x="5641975" y="1387475"/>
-          <p14:tracePt t="8645" x="5741988" y="1470025"/>
-          <p14:tracePt t="8663" x="5761038" y="1550988"/>
-          <p14:tracePt t="8679" x="5724525" y="1641475"/>
-          <p14:tracePt t="8931" x="5761038" y="1704975"/>
-          <p14:tracePt t="8934" x="5824538" y="1760538"/>
-          <p14:tracePt t="8946" x="5859463" y="1824038"/>
-          <p14:tracePt t="8966" x="5959475" y="1905000"/>
-          <p14:tracePt t="8981" x="6132513" y="2078038"/>
-          <p14:tracePt t="8996" x="6332538" y="2195513"/>
-          <p14:tracePt t="9013" x="6486525" y="2249488"/>
-          <p14:tracePt t="9029" x="6604000" y="2295525"/>
-          <p14:tracePt t="9032" x="6740525" y="2312988"/>
-          <p14:tracePt t="9047" x="6804025" y="2312988"/>
-          <p14:tracePt t="9064" x="6840538" y="2312988"/>
-          <p14:tracePt t="9080" x="6875463" y="2312988"/>
-          <p14:tracePt t="9098" x="6904038" y="2312988"/>
-          <p14:tracePt t="9115" x="6875463" y="2312988"/>
-          <p14:tracePt t="9132" x="6757988" y="2312988"/>
-          <p14:tracePt t="9148" x="6604000" y="2312988"/>
-          <p14:tracePt t="9162" x="6486525" y="2332038"/>
-          <p14:tracePt t="9181" x="6367463" y="2349500"/>
-          <p14:tracePt t="9195" x="6269038" y="2395538"/>
-          <p14:tracePt t="9213" x="6196013" y="2413000"/>
-          <p14:tracePt t="9230" x="6113463" y="2449513"/>
-          <p14:tracePt t="9247" x="6042025" y="2466975"/>
-          <p14:tracePt t="9263" x="5995988" y="2486025"/>
-          <p14:tracePt t="9281" x="5959475" y="2486025"/>
-          <p14:tracePt t="9297" x="5922963" y="2503488"/>
-          <p14:tracePt t="9313" x="5878513" y="2503488"/>
-          <p14:tracePt t="9346" x="5824538" y="2530475"/>
-          <p14:tracePt t="9364" x="5741988" y="2530475"/>
-          <p14:tracePt t="9379" x="5661025" y="2530475"/>
-          <p14:tracePt t="9396" x="5605463" y="2486025"/>
-          <p14:tracePt t="9415" x="5524500" y="2466975"/>
-          <p14:tracePt t="9431" x="5487988" y="2430463"/>
-          <p14:tracePt t="9448" x="5451475" y="2413000"/>
-          <p14:tracePt t="9462" x="5407025" y="2366963"/>
-          <p14:tracePt t="9480" x="5351463" y="2332038"/>
-          <p14:tracePt t="9496" x="5316538" y="2312988"/>
-          <p14:tracePt t="9514" x="5287963" y="2295525"/>
-          <p14:tracePt t="9761" x="5316538" y="2312988"/>
-          <p14:tracePt t="11114" x="5351463" y="2312988"/>
-          <p14:tracePt t="11131" x="5407025" y="2312988"/>
-          <p14:tracePt t="11148" x="5470525" y="2312988"/>
-          <p14:tracePt t="11155" x="5507038" y="2312988"/>
-          <p14:tracePt t="11172" x="5570538" y="2312988"/>
-          <p14:tracePt t="11189" x="5624513" y="2312988"/>
-          <p14:tracePt t="11212" x="5688013" y="2332038"/>
-          <p14:tracePt t="11230" x="5741988" y="2366963"/>
-          <p14:tracePt t="11247" x="5824538" y="2413000"/>
-          <p14:tracePt t="11263" x="5895975" y="2449513"/>
-          <p14:tracePt t="11280" x="5995988" y="2486025"/>
-          <p14:tracePt t="11296" x="6078538" y="2503488"/>
-          <p14:tracePt t="11313" x="6132513" y="2503488"/>
-          <p14:tracePt t="11330" x="6176963" y="2530475"/>
-          <p14:tracePt t="11346" x="6196013" y="2530475"/>
-          <p14:tracePt t="11363" x="6232525" y="2530475"/>
-          <p14:tracePt t="11379" x="6249988" y="2530475"/>
-          <p14:tracePt t="11397" x="6269038" y="2549525"/>
-          <p14:tracePt t="11412" x="6296025" y="2549525"/>
-          <p14:tracePt t="11429" x="6332538" y="2549525"/>
-          <p14:tracePt t="11446" x="6350000" y="2566988"/>
-          <p14:tracePt t="11463" x="6367463" y="2566988"/>
-          <p14:tracePt t="11479" x="6386513" y="2566988"/>
-          <p14:tracePt t="11496" x="6413500" y="2586038"/>
-          <p14:tracePt t="11529" x="6430963" y="2586038"/>
-          <p14:tracePt t="12082" x="6430963" y="2566988"/>
-          <p14:tracePt t="12093" x="6450013" y="2530475"/>
-          <p14:tracePt t="12099" x="6467475" y="2486025"/>
-          <p14:tracePt t="12112" x="6486525" y="2449513"/>
-          <p14:tracePt t="12130" x="6503988" y="2413000"/>
-          <p14:tracePt t="12147" x="6550025" y="2312988"/>
-          <p14:tracePt t="12162" x="6567488" y="2232025"/>
-          <p14:tracePt t="12180" x="6567488" y="2159000"/>
-          <p14:tracePt t="12196" x="6604000" y="2078038"/>
-          <p14:tracePt t="12214" x="6621463" y="1995488"/>
-          <p14:tracePt t="12230" x="6650038" y="1941513"/>
-          <p14:tracePt t="12246" x="6684963" y="1878013"/>
-          <p14:tracePt t="12263" x="6704013" y="1804988"/>
-          <p14:tracePt t="12280" x="6740525" y="1704975"/>
-          <p14:tracePt t="12297" x="6784975" y="1604963"/>
-          <p14:tracePt t="12312" x="6840538" y="1506538"/>
-          <p14:tracePt t="12330" x="6904038" y="1433513"/>
-          <p14:tracePt t="12346" x="6958013" y="1387475"/>
-          <p14:tracePt t="12363" x="6994525" y="1387475"/>
-          <p14:tracePt t="12379" x="7021513" y="1387475"/>
-          <p14:tracePt t="12396" x="7058025" y="1470025"/>
-          <p14:tracePt t="12414" x="7094538" y="1550988"/>
-          <p14:tracePt t="12430" x="7158038" y="1624013"/>
-          <p14:tracePt t="12447" x="7212013" y="1687513"/>
-          <p14:tracePt t="12462" x="7292975" y="1741488"/>
-          <p14:tracePt t="12480" x="7366000" y="1804988"/>
-          <p14:tracePt t="12497" x="7446963" y="1841500"/>
-          <p14:tracePt t="12514" x="7602538" y="1858963"/>
-          <p14:tracePt t="12530" x="7700963" y="1858963"/>
-          <p14:tracePt t="12545" x="7747000" y="1824038"/>
-          <p14:tracePt t="12563" x="7764463" y="1741488"/>
-          <p14:tracePt t="12579" x="7764463" y="1604963"/>
-          <p14:tracePt t="12597" x="7720013" y="1524000"/>
-          <p14:tracePt t="12612" x="7666038" y="1433513"/>
-          <p14:tracePt t="12629" x="7583488" y="1370013"/>
-          <p14:tracePt t="12646" x="7546975" y="1316038"/>
-          <p14:tracePt t="12663" x="7529513" y="1316038"/>
-          <p14:tracePt t="12679" x="7510463" y="1296988"/>
-          <p14:tracePt t="12706" x="7529513" y="1296988"/>
-          <p14:tracePt t="12715" x="7546975" y="1296988"/>
-          <p14:tracePt t="12744" x="7583488" y="1333500"/>
-          <p14:tracePt t="12762" x="7720013" y="1450975"/>
-          <p14:tracePt t="12779" x="7783513" y="1550988"/>
-          <p14:tracePt t="12796" x="7820025" y="1641475"/>
-          <p14:tracePt t="12812" x="7837488" y="1704975"/>
-          <p14:tracePt t="12829" x="7856538" y="1741488"/>
-          <p14:tracePt t="12864" x="7856538" y="1724025"/>
-          <p14:tracePt t="12896" x="7837488" y="1687513"/>
-          <p14:tracePt t="12915" x="7820025" y="1668463"/>
-          <p14:tracePt t="12929" x="7820025" y="1641475"/>
-          <p14:tracePt t="12965" x="7800975" y="1641475"/>
-          <p14:tracePt t="12998" x="7783513" y="1641475"/>
-          <p14:tracePt t="13014" x="7783513" y="1668463"/>
-          <p14:tracePt t="13030" x="7764463" y="1687513"/>
-          <p14:tracePt t="13047" x="7700963" y="1760538"/>
-          <p14:tracePt t="13062" x="7602538" y="1878013"/>
-          <p14:tracePt t="13080" x="7483475" y="2041525"/>
-          <p14:tracePt t="13096" x="7275513" y="2276475"/>
-          <p14:tracePt t="13114" x="7175500" y="2366963"/>
-          <p14:tracePt t="13130" x="7075488" y="2449513"/>
-          <p14:tracePt t="13147" x="6994525" y="2486025"/>
-          <p14:tracePt t="13162" x="6975475" y="2503488"/>
-          <p14:tracePt t="13180" x="6958013" y="2503488"/>
-          <p14:tracePt t="13214" x="6938963" y="2503488"/>
-          <p14:tracePt t="13272" x="6938963" y="2530475"/>
-          <p14:tracePt t="13312" x="6938963" y="2549525"/>
-          <p14:tracePt t="13330" x="6921500" y="2566988"/>
-          <p14:tracePt t="13362" x="6904038" y="2603500"/>
-          <p14:tracePt t="13379" x="6875463" y="2649538"/>
-          <p14:tracePt t="13396" x="6858000" y="2667000"/>
-          <p14:tracePt t="13413" x="6840538" y="2667000"/>
-          <p14:tracePt t="13446" x="6821488" y="2667000"/>
-          <p14:tracePt t="13480" x="6821488" y="2620963"/>
-          <p14:tracePt t="13497" x="6821488" y="2603500"/>
-          <p14:tracePt t="13530" x="6821488" y="2586038"/>
-          <p14:tracePt t="13591" x="6821488" y="2566988"/>
-          <p14:tracePt t="13599" x="6821488" y="2549525"/>
-          <p14:tracePt t="13613" x="6821488" y="2503488"/>
-          <p14:tracePt t="13630" x="6821488" y="2449513"/>
-          <p14:tracePt t="13647" x="6821488" y="2312988"/>
-          <p14:tracePt t="13662" x="6821488" y="2176463"/>
-          <p14:tracePt t="13680" x="6840538" y="2078038"/>
-          <p14:tracePt t="13696" x="6858000" y="2014538"/>
-          <p14:tracePt t="13714" x="6875463" y="1995488"/>
-          <p14:tracePt t="13746" x="6904038" y="2058988"/>
-          <p14:tracePt t="13763" x="6904038" y="2132013"/>
-          <p14:tracePt t="13780" x="6904038" y="2232025"/>
-          <p14:tracePt t="13798" x="6904038" y="2295525"/>
-          <p14:tracePt t="13813" x="6904038" y="2312988"/>
-          <p14:tracePt t="13846" x="6904038" y="2276475"/>
-          <p14:tracePt t="13863" x="6904038" y="2195513"/>
-          <p14:tracePt t="13880" x="6921500" y="2159000"/>
-          <p14:tracePt t="13896" x="6938963" y="2112963"/>
-          <p14:tracePt t="13913" x="6958013" y="2095500"/>
-          <p14:tracePt t="13930" x="6975475" y="2095500"/>
-          <p14:tracePt t="13963" x="6975475" y="2078038"/>
-          <p14:tracePt t="13996" x="6975475" y="1995488"/>
-          <p14:tracePt t="14014" x="6938963" y="1878013"/>
-          <p14:tracePt t="14017" x="6840538" y="1587500"/>
-          <p14:tracePt t="14030" x="6821488" y="1524000"/>
-          <p14:tracePt t="14047" x="6804025" y="1470025"/>
-          <p14:tracePt t="14063" x="6784975" y="1350963"/>
-          <p14:tracePt t="14080" x="6784975" y="1316038"/>
-          <p14:tracePt t="14082" x="6784975" y="1296988"/>
-          <p14:tracePt t="14102" x="6784975" y="1316038"/>
-          <p14:tracePt t="14113" x="6804025" y="1350963"/>
-          <p14:tracePt t="14130" x="6821488" y="1387475"/>
-          <p14:tracePt t="14146" x="6840538" y="1450975"/>
-          <p14:tracePt t="14163" x="6858000" y="1524000"/>
-          <p14:tracePt t="14180" x="6904038" y="1624013"/>
-          <p14:tracePt t="14197" x="6921500" y="1687513"/>
-          <p14:tracePt t="14213" x="6938963" y="1724025"/>
-          <p14:tracePt t="14229" x="6938963" y="1704975"/>
-          <p14:tracePt t="14237" x="6938963" y="1668463"/>
-          <p14:tracePt t="14246" x="6938963" y="1604963"/>
-          <p14:tracePt t="14263" x="6958013" y="1570038"/>
-          <p14:tracePt t="14280" x="6958013" y="1524000"/>
-          <p14:tracePt t="14296" x="6958013" y="1433513"/>
-          <p14:tracePt t="14314" x="6975475" y="1370013"/>
-          <p14:tracePt t="14330" x="6975475" y="1333500"/>
-          <p14:tracePt t="14347" x="6994525" y="1333500"/>
-          <p14:tracePt t="14381" x="6975475" y="1350963"/>
-          <p14:tracePt t="14413" x="6958013" y="1350963"/>
-          <p14:tracePt t="14430" x="6921500" y="1350963"/>
-          <p14:tracePt t="14446" x="6904038" y="1333500"/>
-          <p14:tracePt t="14464" x="6840538" y="1233488"/>
-          <p14:tracePt t="14479" x="6784975" y="1062038"/>
-          <p14:tracePt t="14496" x="6704013" y="808038"/>
-          <p14:tracePt t="14514" x="6621463" y="525463"/>
-          <p14:tracePt t="14530" x="6550025" y="290513"/>
-        </p14:tracePtLst>
-      </p14:laserTraceLst>
-    </p:ext>
-  </p:extLst>
 </p:sld>
 </file>
 
-<file path=ppt/slides/slide3.xml><?xml version="1.0" encoding="utf-8"?>
+<file path=ppt/slides/slide4.xml><?xml version="1.0" encoding="utf-8"?>
 <p:sld xmlns:a="http://schemas.openxmlformats.org/drawingml/2006/main" xmlns:r="http://schemas.openxmlformats.org/officeDocument/2006/relationships" xmlns:p="http://schemas.openxmlformats.org/presentationml/2006/main">
   <p:cSld>
     <p:spTree>
@@ -16841,7 +16640,7 @@
             </a:prstGeom>
             <a:ln w="34925">
               <a:solidFill>
-                <a:srgbClr val="C00000"/>
+                <a:srgbClr val="0070C0"/>
               </a:solidFill>
             </a:ln>
           </p:spPr>
@@ -16891,7 +16690,7 @@
               <a:r>
                 <a:rPr lang="en-ES" dirty="0">
                   <a:solidFill>
-                    <a:srgbClr val="C00000"/>
+                    <a:srgbClr val="0070C0"/>
                   </a:solidFill>
                 </a:rPr>
                 <a:t>h</a:t>
@@ -16899,7 +16698,7 @@
               <a:r>
                 <a:rPr lang="en-ES" baseline="-25000" dirty="0">
                   <a:solidFill>
-                    <a:srgbClr val="C00000"/>
+                    <a:srgbClr val="0070C0"/>
                   </a:solidFill>
                 </a:rPr>
                 <a:t>0</a:t>
@@ -19842,7 +19641,7 @@
             <a:r>
               <a:rPr lang="en-GB" sz="1500" dirty="0">
                 <a:solidFill>
-                  <a:srgbClr val="C00000"/>
+                  <a:srgbClr val="0070C0"/>
                 </a:solidFill>
               </a:rPr>
               <a:t>h</a:t>
@@ -19850,7 +19649,7 @@
             <a:r>
               <a:rPr lang="en-ES" sz="1500" baseline="-25000" dirty="0">
                 <a:solidFill>
-                  <a:srgbClr val="C00000"/>
+                  <a:srgbClr val="0070C0"/>
                 </a:solidFill>
               </a:rPr>
               <a:t>0</a:t>
@@ -19858,7 +19657,7 @@
             <a:r>
               <a:rPr lang="en-ES" sz="1500" dirty="0">
                 <a:solidFill>
-                  <a:srgbClr val="C00000"/>
+                  <a:srgbClr val="0070C0"/>
                 </a:solidFill>
               </a:rPr>
               <a:t>:  Cuotas excesivas extinguen la población</a:t>
@@ -22026,7 +21825,371 @@
 </p:sld>
 </file>
 
-<file path=ppt/slides/slide4.xml><?xml version="1.0" encoding="utf-8"?>
+<file path=ppt/slides/slide5.xml><?xml version="1.0" encoding="utf-8"?>
+<p:sld xmlns:a="http://schemas.openxmlformats.org/drawingml/2006/main" xmlns:r="http://schemas.openxmlformats.org/officeDocument/2006/relationships" xmlns:p="http://schemas.openxmlformats.org/presentationml/2006/main">
+  <p:cSld>
+    <p:spTree>
+      <p:nvGrpSpPr>
+        <p:cNvPr id="1" name=""/>
+        <p:cNvGrpSpPr/>
+        <p:nvPr/>
+      </p:nvGrpSpPr>
+      <p:grpSpPr>
+        <a:xfrm>
+          <a:off x="0" y="0"/>
+          <a:ext cx="0" cy="0"/>
+          <a:chOff x="0" y="0"/>
+          <a:chExt cx="0" cy="0"/>
+        </a:xfrm>
+      </p:grpSpPr>
+      <p:sp>
+        <p:nvSpPr>
+          <p:cNvPr id="2" name="Rectangle 3">
+            <a:extLst>
+              <a:ext uri="{FF2B5EF4-FFF2-40B4-BE49-F238E27FC236}">
+                <a16:creationId xmlns:a16="http://schemas.microsoft.com/office/drawing/2014/main" id="{D51B1315-2A52-86F8-0C79-B30047C2AB48}"/>
+              </a:ext>
+            </a:extLst>
+          </p:cNvPr>
+          <p:cNvSpPr txBox="1">
+            <a:spLocks noChangeArrowheads="1"/>
+          </p:cNvSpPr>
+          <p:nvPr/>
+        </p:nvSpPr>
+        <p:spPr>
+          <a:xfrm>
+            <a:off x="749754" y="1375895"/>
+            <a:ext cx="8153400" cy="3830638"/>
+          </a:xfrm>
+          <a:prstGeom prst="rect">
+            <a:avLst/>
+          </a:prstGeom>
+        </p:spPr>
+        <p:txBody>
+          <a:bodyPr wrap="square" lIns="0"/>
+          <a:lstStyle>
+            <a:lvl1pPr marL="228600" indent="-228600" algn="l" defTabSz="914400" rtl="0" eaLnBrk="1" latinLnBrk="0" hangingPunct="1">
+              <a:lnSpc>
+                <a:spcPct val="90000"/>
+              </a:lnSpc>
+              <a:spcBef>
+                <a:spcPts val="1000"/>
+              </a:spcBef>
+              <a:buFont typeface="Arial" panose="020B0604020202020204" pitchFamily="34" charset="0"/>
+              <a:buChar char="•"/>
+              <a:defRPr sz="2800" kern="1200">
+                <a:solidFill>
+                  <a:schemeClr val="tx1"/>
+                </a:solidFill>
+                <a:latin typeface="+mn-lt"/>
+                <a:ea typeface="+mn-ea"/>
+                <a:cs typeface="+mn-cs"/>
+              </a:defRPr>
+            </a:lvl1pPr>
+            <a:lvl2pPr marL="685800" indent="-228600" algn="l" defTabSz="914400" rtl="0" eaLnBrk="1" latinLnBrk="0" hangingPunct="1">
+              <a:lnSpc>
+                <a:spcPct val="90000"/>
+              </a:lnSpc>
+              <a:spcBef>
+                <a:spcPts val="500"/>
+              </a:spcBef>
+              <a:buFont typeface="Arial" panose="020B0604020202020204" pitchFamily="34" charset="0"/>
+              <a:buChar char="•"/>
+              <a:defRPr sz="2400" kern="1200">
+                <a:solidFill>
+                  <a:schemeClr val="tx1"/>
+                </a:solidFill>
+                <a:latin typeface="+mn-lt"/>
+                <a:ea typeface="+mn-ea"/>
+                <a:cs typeface="+mn-cs"/>
+              </a:defRPr>
+            </a:lvl2pPr>
+            <a:lvl3pPr marL="1143000" indent="-228600" algn="l" defTabSz="914400" rtl="0" eaLnBrk="1" latinLnBrk="0" hangingPunct="1">
+              <a:lnSpc>
+                <a:spcPct val="90000"/>
+              </a:lnSpc>
+              <a:spcBef>
+                <a:spcPts val="500"/>
+              </a:spcBef>
+              <a:buFont typeface="Arial" panose="020B0604020202020204" pitchFamily="34" charset="0"/>
+              <a:buChar char="•"/>
+              <a:defRPr sz="2000" kern="1200">
+                <a:solidFill>
+                  <a:schemeClr val="tx1"/>
+                </a:solidFill>
+                <a:latin typeface="+mn-lt"/>
+                <a:ea typeface="+mn-ea"/>
+                <a:cs typeface="+mn-cs"/>
+              </a:defRPr>
+            </a:lvl3pPr>
+            <a:lvl4pPr marL="1600200" indent="-228600" algn="l" defTabSz="914400" rtl="0" eaLnBrk="1" latinLnBrk="0" hangingPunct="1">
+              <a:lnSpc>
+                <a:spcPct val="90000"/>
+              </a:lnSpc>
+              <a:spcBef>
+                <a:spcPts val="500"/>
+              </a:spcBef>
+              <a:buFont typeface="Arial" panose="020B0604020202020204" pitchFamily="34" charset="0"/>
+              <a:buChar char="•"/>
+              <a:defRPr sz="1800" kern="1200">
+                <a:solidFill>
+                  <a:schemeClr val="tx1"/>
+                </a:solidFill>
+                <a:latin typeface="+mn-lt"/>
+                <a:ea typeface="+mn-ea"/>
+                <a:cs typeface="+mn-cs"/>
+              </a:defRPr>
+            </a:lvl4pPr>
+            <a:lvl5pPr marL="2057400" indent="-228600" algn="l" defTabSz="914400" rtl="0" eaLnBrk="1" latinLnBrk="0" hangingPunct="1">
+              <a:lnSpc>
+                <a:spcPct val="90000"/>
+              </a:lnSpc>
+              <a:spcBef>
+                <a:spcPts val="500"/>
+              </a:spcBef>
+              <a:buFont typeface="Arial" panose="020B0604020202020204" pitchFamily="34" charset="0"/>
+              <a:buChar char="•"/>
+              <a:defRPr sz="1800" kern="1200">
+                <a:solidFill>
+                  <a:schemeClr val="tx1"/>
+                </a:solidFill>
+                <a:latin typeface="+mn-lt"/>
+                <a:ea typeface="+mn-ea"/>
+                <a:cs typeface="+mn-cs"/>
+              </a:defRPr>
+            </a:lvl5pPr>
+            <a:lvl6pPr marL="2514600" indent="-228600" algn="l" defTabSz="914400" rtl="0" eaLnBrk="1" latinLnBrk="0" hangingPunct="1">
+              <a:lnSpc>
+                <a:spcPct val="90000"/>
+              </a:lnSpc>
+              <a:spcBef>
+                <a:spcPts val="500"/>
+              </a:spcBef>
+              <a:buFont typeface="Arial" panose="020B0604020202020204" pitchFamily="34" charset="0"/>
+              <a:buChar char="•"/>
+              <a:defRPr sz="1800" kern="1200">
+                <a:solidFill>
+                  <a:schemeClr val="tx1"/>
+                </a:solidFill>
+                <a:latin typeface="+mn-lt"/>
+                <a:ea typeface="+mn-ea"/>
+                <a:cs typeface="+mn-cs"/>
+              </a:defRPr>
+            </a:lvl6pPr>
+            <a:lvl7pPr marL="2971800" indent="-228600" algn="l" defTabSz="914400" rtl="0" eaLnBrk="1" latinLnBrk="0" hangingPunct="1">
+              <a:lnSpc>
+                <a:spcPct val="90000"/>
+              </a:lnSpc>
+              <a:spcBef>
+                <a:spcPts val="500"/>
+              </a:spcBef>
+              <a:buFont typeface="Arial" panose="020B0604020202020204" pitchFamily="34" charset="0"/>
+              <a:buChar char="•"/>
+              <a:defRPr sz="1800" kern="1200">
+                <a:solidFill>
+                  <a:schemeClr val="tx1"/>
+                </a:solidFill>
+                <a:latin typeface="+mn-lt"/>
+                <a:ea typeface="+mn-ea"/>
+                <a:cs typeface="+mn-cs"/>
+              </a:defRPr>
+            </a:lvl7pPr>
+            <a:lvl8pPr marL="3429000" indent="-228600" algn="l" defTabSz="914400" rtl="0" eaLnBrk="1" latinLnBrk="0" hangingPunct="1">
+              <a:lnSpc>
+                <a:spcPct val="90000"/>
+              </a:lnSpc>
+              <a:spcBef>
+                <a:spcPts val="500"/>
+              </a:spcBef>
+              <a:buFont typeface="Arial" panose="020B0604020202020204" pitchFamily="34" charset="0"/>
+              <a:buChar char="•"/>
+              <a:defRPr sz="1800" kern="1200">
+                <a:solidFill>
+                  <a:schemeClr val="tx1"/>
+                </a:solidFill>
+                <a:latin typeface="+mn-lt"/>
+                <a:ea typeface="+mn-ea"/>
+                <a:cs typeface="+mn-cs"/>
+              </a:defRPr>
+            </a:lvl8pPr>
+            <a:lvl9pPr marL="3886200" indent="-228600" algn="l" defTabSz="914400" rtl="0" eaLnBrk="1" latinLnBrk="0" hangingPunct="1">
+              <a:lnSpc>
+                <a:spcPct val="90000"/>
+              </a:lnSpc>
+              <a:spcBef>
+                <a:spcPts val="500"/>
+              </a:spcBef>
+              <a:buFont typeface="Arial" panose="020B0604020202020204" pitchFamily="34" charset="0"/>
+              <a:buChar char="•"/>
+              <a:defRPr sz="1800" kern="1200">
+                <a:solidFill>
+                  <a:schemeClr val="tx1"/>
+                </a:solidFill>
+                <a:latin typeface="+mn-lt"/>
+                <a:ea typeface="+mn-ea"/>
+                <a:cs typeface="+mn-cs"/>
+              </a:defRPr>
+            </a:lvl9pPr>
+          </a:lstStyle>
+          <a:p>
+            <a:pPr>
+              <a:buFont typeface="Symbol" pitchFamily="2" charset="2"/>
+              <a:buNone/>
+            </a:pPr>
+            <a:r>
+              <a:rPr lang="es-ES_tradnl" altLang="en-US" b="1" dirty="0"/>
+              <a:t>Limitaciones</a:t>
+            </a:r>
+            <a:r>
+              <a:rPr lang="es-ES_tradnl" altLang="en-US" dirty="0"/>
+              <a:t>:</a:t>
+            </a:r>
+          </a:p>
+          <a:p>
+            <a:pPr>
+              <a:buFontTx/>
+              <a:buChar char="•"/>
+            </a:pPr>
+            <a:r>
+              <a:rPr lang="es-ES_tradnl" altLang="en-US" sz="2400" dirty="0"/>
+              <a:t>Considera todos individuos de la población similares</a:t>
+            </a:r>
+          </a:p>
+          <a:p>
+            <a:pPr>
+              <a:buFontTx/>
+              <a:buChar char="•"/>
+            </a:pPr>
+            <a:r>
+              <a:rPr lang="es-ES_tradnl" altLang="en-US" sz="2400" dirty="0"/>
+              <a:t>Ambientes invariables (K es constante)</a:t>
+            </a:r>
+          </a:p>
+          <a:p>
+            <a:pPr>
+              <a:buFontTx/>
+              <a:buChar char="•"/>
+            </a:pPr>
+            <a:r>
+              <a:rPr lang="es-ES_tradnl" altLang="en-US" sz="2400" dirty="0"/>
+              <a:t>Dificultad estimas poblaciones</a:t>
+            </a:r>
+          </a:p>
+          <a:p>
+            <a:pPr>
+              <a:buFontTx/>
+              <a:buChar char="•"/>
+            </a:pPr>
+            <a:r>
+              <a:rPr lang="es-ES_tradnl" altLang="en-US" sz="2400" dirty="0"/>
+              <a:t>Hay que conocer como es la curva de reclutamiento</a:t>
+            </a:r>
+          </a:p>
+          <a:p>
+            <a:pPr>
+              <a:buFontTx/>
+              <a:buChar char="•"/>
+            </a:pPr>
+            <a:r>
+              <a:rPr lang="es-ES_tradnl" altLang="en-US" sz="2400" dirty="0"/>
+              <a:t> Puede llevar a la extinción de las poblaciones</a:t>
+            </a:r>
+          </a:p>
+          <a:p>
+            <a:pPr>
+              <a:buFont typeface="Symbol" pitchFamily="2" charset="2"/>
+              <a:buNone/>
+            </a:pPr>
+            <a:r>
+              <a:rPr lang="es-ES_tradnl" altLang="en-US" b="1" dirty="0"/>
+              <a:t>Ventajas</a:t>
+            </a:r>
+            <a:r>
+              <a:rPr lang="es-ES_tradnl" altLang="en-US" dirty="0"/>
+              <a:t>:</a:t>
+            </a:r>
+          </a:p>
+          <a:p>
+            <a:pPr>
+              <a:buFontTx/>
+              <a:buChar char="•"/>
+            </a:pPr>
+            <a:r>
+              <a:rPr lang="es-ES_tradnl" altLang="en-US" dirty="0"/>
+              <a:t> </a:t>
+            </a:r>
+            <a:r>
+              <a:rPr lang="es-ES_tradnl" altLang="en-US" sz="2400" dirty="0"/>
+              <a:t>Capturas constantes</a:t>
+            </a:r>
+            <a:r>
+              <a:rPr lang="es-ES_tradnl" altLang="en-US" dirty="0"/>
+              <a:t> </a:t>
+            </a:r>
+          </a:p>
+        </p:txBody>
+      </p:sp>
+      <p:sp>
+        <p:nvSpPr>
+          <p:cNvPr id="3" name="TextBox 107">
+            <a:extLst>
+              <a:ext uri="{FF2B5EF4-FFF2-40B4-BE49-F238E27FC236}">
+                <a16:creationId xmlns:a16="http://schemas.microsoft.com/office/drawing/2014/main" id="{FCAA5485-7D6E-3F6D-D8EC-727113469A19}"/>
+              </a:ext>
+            </a:extLst>
+          </p:cNvPr>
+          <p:cNvSpPr txBox="1"/>
+          <p:nvPr/>
+        </p:nvSpPr>
+        <p:spPr>
+          <a:xfrm>
+            <a:off x="749754" y="421372"/>
+            <a:ext cx="10699035" cy="523220"/>
+          </a:xfrm>
+          <a:prstGeom prst="rect">
+            <a:avLst/>
+          </a:prstGeom>
+          <a:solidFill>
+            <a:schemeClr val="tx1"/>
+          </a:solidFill>
+        </p:spPr>
+        <p:txBody>
+          <a:bodyPr wrap="square" rtlCol="0">
+            <a:spAutoFit/>
+          </a:bodyPr>
+          <a:lstStyle/>
+          <a:p>
+            <a:pPr algn="ctr"/>
+            <a:r>
+              <a:rPr lang="es-ES" sz="2800" dirty="0">
+                <a:solidFill>
+                  <a:schemeClr val="bg1"/>
+                </a:solidFill>
+              </a:rPr>
+              <a:t>LIMITACIONES Y VENTAJAS DE LA EXTRACCIÓN DE UNA CUOTA FIJA</a:t>
+            </a:r>
+            <a:endParaRPr lang="en-ES" sz="2800" dirty="0">
+              <a:solidFill>
+                <a:schemeClr val="bg1"/>
+              </a:solidFill>
+            </a:endParaRPr>
+          </a:p>
+        </p:txBody>
+      </p:sp>
+    </p:spTree>
+    <p:extLst>
+      <p:ext uri="{BB962C8B-B14F-4D97-AF65-F5344CB8AC3E}">
+        <p14:creationId xmlns:p14="http://schemas.microsoft.com/office/powerpoint/2010/main" val="785946916"/>
+      </p:ext>
+    </p:extLst>
+  </p:cSld>
+  <p:clrMapOvr>
+    <a:masterClrMapping/>
+  </p:clrMapOvr>
+</p:sld>
+</file>
+
+<file path=ppt/slides/slide6.xml><?xml version="1.0" encoding="utf-8"?>
 <p:sld xmlns:a="http://schemas.openxmlformats.org/drawingml/2006/main" xmlns:r="http://schemas.openxmlformats.org/officeDocument/2006/relationships" xmlns:p="http://schemas.openxmlformats.org/presentationml/2006/main">
   <p:cSld>
     <p:spTree>
@@ -25413,7 +25576,7 @@
             </a:prstGeom>
             <a:ln w="34925">
               <a:solidFill>
-                <a:srgbClr val="C00000"/>
+                <a:srgbClr val="0070C0"/>
               </a:solidFill>
             </a:ln>
           </p:spPr>
@@ -25463,7 +25626,7 @@
               <a:r>
                 <a:rPr lang="en-ES" dirty="0">
                   <a:solidFill>
-                    <a:srgbClr val="C00000"/>
+                    <a:srgbClr val="0070C0"/>
                   </a:solidFill>
                 </a:rPr>
                 <a:t>E</a:t>
@@ -25471,7 +25634,7 @@
               <a:r>
                 <a:rPr lang="en-ES" baseline="-25000" dirty="0">
                   <a:solidFill>
-                    <a:srgbClr val="C00000"/>
+                    <a:srgbClr val="0070C0"/>
                   </a:solidFill>
                 </a:rPr>
                 <a:t>0</a:t>
@@ -28448,7 +28611,7 @@
             <a:r>
               <a:rPr lang="en-GB" sz="1500" dirty="0">
                 <a:solidFill>
-                  <a:srgbClr val="C00000"/>
+                  <a:srgbClr val="0070C0"/>
                 </a:solidFill>
               </a:rPr>
               <a:t>E</a:t>
@@ -28456,7 +28619,7 @@
             <a:r>
               <a:rPr lang="en-ES" sz="1500" baseline="-25000" dirty="0">
                 <a:solidFill>
-                  <a:srgbClr val="C00000"/>
+                  <a:srgbClr val="0070C0"/>
                 </a:solidFill>
               </a:rPr>
               <a:t>0</a:t>
@@ -28464,7 +28627,7 @@
             <a:r>
               <a:rPr lang="en-ES" sz="1500" dirty="0">
                 <a:solidFill>
-                  <a:srgbClr val="C00000"/>
+                  <a:srgbClr val="0070C0"/>
                 </a:solidFill>
               </a:rPr>
               <a:t>:  Esfuerzos excesivos extinguen la población</a:t>
@@ -30426,7 +30589,317 @@
 </p:sld>
 </file>
 
-<file path=ppt/slides/slide5.xml><?xml version="1.0" encoding="utf-8"?>
+<file path=ppt/slides/slide7.xml><?xml version="1.0" encoding="utf-8"?>
+<p:sld xmlns:a="http://schemas.openxmlformats.org/drawingml/2006/main" xmlns:r="http://schemas.openxmlformats.org/officeDocument/2006/relationships" xmlns:p="http://schemas.openxmlformats.org/presentationml/2006/main">
+  <p:cSld>
+    <p:spTree>
+      <p:nvGrpSpPr>
+        <p:cNvPr id="1" name=""/>
+        <p:cNvGrpSpPr/>
+        <p:nvPr/>
+      </p:nvGrpSpPr>
+      <p:grpSpPr>
+        <a:xfrm>
+          <a:off x="0" y="0"/>
+          <a:ext cx="0" cy="0"/>
+          <a:chOff x="0" y="0"/>
+          <a:chExt cx="0" cy="0"/>
+        </a:xfrm>
+      </p:grpSpPr>
+      <p:sp>
+        <p:nvSpPr>
+          <p:cNvPr id="3" name="Rectangle 3">
+            <a:extLst>
+              <a:ext uri="{FF2B5EF4-FFF2-40B4-BE49-F238E27FC236}">
+                <a16:creationId xmlns:a16="http://schemas.microsoft.com/office/drawing/2014/main" id="{C59B307F-07F8-4E3A-3366-04414153E92C}"/>
+              </a:ext>
+            </a:extLst>
+          </p:cNvPr>
+          <p:cNvSpPr txBox="1">
+            <a:spLocks noChangeArrowheads="1"/>
+          </p:cNvSpPr>
+          <p:nvPr/>
+        </p:nvSpPr>
+        <p:spPr>
+          <a:xfrm>
+            <a:off x="749754" y="1182631"/>
+            <a:ext cx="10882160" cy="5518794"/>
+          </a:xfrm>
+          <a:prstGeom prst="rect">
+            <a:avLst/>
+          </a:prstGeom>
+        </p:spPr>
+        <p:txBody>
+          <a:bodyPr wrap="square" lIns="0"/>
+          <a:lstStyle>
+            <a:defPPr>
+              <a:defRPr lang="en-ES"/>
+            </a:defPPr>
+            <a:lvl1pPr marL="228600" indent="-228600">
+              <a:lnSpc>
+                <a:spcPct val="90000"/>
+              </a:lnSpc>
+              <a:spcBef>
+                <a:spcPts val="1000"/>
+              </a:spcBef>
+              <a:buFont typeface="Symbol" pitchFamily="2" charset="2"/>
+              <a:buNone/>
+              <a:defRPr sz="2800" b="1"/>
+            </a:lvl1pPr>
+            <a:lvl2pPr marL="685800" indent="-228600">
+              <a:lnSpc>
+                <a:spcPct val="90000"/>
+              </a:lnSpc>
+              <a:spcBef>
+                <a:spcPts val="500"/>
+              </a:spcBef>
+              <a:buFont typeface="Arial" panose="020B0604020202020204" pitchFamily="34" charset="0"/>
+              <a:buChar char="•"/>
+              <a:defRPr sz="2400"/>
+            </a:lvl2pPr>
+            <a:lvl3pPr marL="1143000" indent="-228600">
+              <a:lnSpc>
+                <a:spcPct val="90000"/>
+              </a:lnSpc>
+              <a:spcBef>
+                <a:spcPts val="500"/>
+              </a:spcBef>
+              <a:buFont typeface="Arial" panose="020B0604020202020204" pitchFamily="34" charset="0"/>
+              <a:buChar char="•"/>
+              <a:defRPr sz="2000"/>
+            </a:lvl3pPr>
+            <a:lvl4pPr marL="1600200" indent="-228600">
+              <a:lnSpc>
+                <a:spcPct val="90000"/>
+              </a:lnSpc>
+              <a:spcBef>
+                <a:spcPts val="500"/>
+              </a:spcBef>
+              <a:buFont typeface="Arial" panose="020B0604020202020204" pitchFamily="34" charset="0"/>
+              <a:buChar char="•"/>
+            </a:lvl4pPr>
+            <a:lvl5pPr marL="2057400" indent="-228600">
+              <a:lnSpc>
+                <a:spcPct val="90000"/>
+              </a:lnSpc>
+              <a:spcBef>
+                <a:spcPts val="500"/>
+              </a:spcBef>
+              <a:buFont typeface="Arial" panose="020B0604020202020204" pitchFamily="34" charset="0"/>
+              <a:buChar char="•"/>
+            </a:lvl5pPr>
+            <a:lvl6pPr marL="2514600" indent="-228600">
+              <a:lnSpc>
+                <a:spcPct val="90000"/>
+              </a:lnSpc>
+              <a:spcBef>
+                <a:spcPts val="500"/>
+              </a:spcBef>
+              <a:buFont typeface="Arial" panose="020B0604020202020204" pitchFamily="34" charset="0"/>
+              <a:buChar char="•"/>
+            </a:lvl6pPr>
+            <a:lvl7pPr marL="2971800" indent="-228600">
+              <a:lnSpc>
+                <a:spcPct val="90000"/>
+              </a:lnSpc>
+              <a:spcBef>
+                <a:spcPts val="500"/>
+              </a:spcBef>
+              <a:buFont typeface="Arial" panose="020B0604020202020204" pitchFamily="34" charset="0"/>
+              <a:buChar char="•"/>
+            </a:lvl7pPr>
+            <a:lvl8pPr marL="3429000" indent="-228600">
+              <a:lnSpc>
+                <a:spcPct val="90000"/>
+              </a:lnSpc>
+              <a:spcBef>
+                <a:spcPts val="500"/>
+              </a:spcBef>
+              <a:buFont typeface="Arial" panose="020B0604020202020204" pitchFamily="34" charset="0"/>
+              <a:buChar char="•"/>
+            </a:lvl8pPr>
+            <a:lvl9pPr marL="3886200" indent="-228600">
+              <a:lnSpc>
+                <a:spcPct val="90000"/>
+              </a:lnSpc>
+              <a:spcBef>
+                <a:spcPts val="500"/>
+              </a:spcBef>
+              <a:buFont typeface="Arial" panose="020B0604020202020204" pitchFamily="34" charset="0"/>
+              <a:buChar char="•"/>
+            </a:lvl9pPr>
+          </a:lstStyle>
+          <a:p>
+            <a:pPr marL="0" indent="0"/>
+            <a:r>
+              <a:rPr lang="es-ES_tradnl" altLang="en-US" dirty="0"/>
+              <a:t>Ventajas:</a:t>
+            </a:r>
+          </a:p>
+          <a:p>
+            <a:pPr marL="273050" indent="-273050">
+              <a:buFont typeface="Arial" panose="020B0604020202020204" pitchFamily="34" charset="0"/>
+              <a:buChar char="•"/>
+            </a:pPr>
+            <a:r>
+              <a:rPr lang="es-ES_tradnl" altLang="en-US" sz="2400" b="0" dirty="0"/>
+              <a:t>Menos arriesgada</a:t>
+            </a:r>
+          </a:p>
+          <a:p>
+            <a:pPr marL="273050" indent="-273050">
+              <a:buFont typeface="Arial" panose="020B0604020202020204" pitchFamily="34" charset="0"/>
+              <a:buChar char="•"/>
+            </a:pPr>
+            <a:r>
+              <a:rPr lang="es-ES" altLang="es-ES" sz="2400" b="0" dirty="0"/>
+              <a:t>Facilita el control directo de las actividades de captura.</a:t>
+            </a:r>
+          </a:p>
+          <a:p>
+            <a:pPr marL="273050" indent="-273050">
+              <a:buFont typeface="Arial" panose="020B0604020202020204" pitchFamily="34" charset="0"/>
+              <a:buChar char="•"/>
+            </a:pPr>
+            <a:r>
+              <a:rPr lang="es-ES" altLang="es-ES" sz="2400" b="0" dirty="0"/>
+              <a:t>Es flexible y aplicable a diferentes tipos de actividades </a:t>
+            </a:r>
+          </a:p>
+          <a:p>
+            <a:pPr marL="273050" indent="-273050">
+              <a:buFont typeface="Arial" panose="020B0604020202020204" pitchFamily="34" charset="0"/>
+              <a:buChar char="•"/>
+            </a:pPr>
+            <a:r>
+              <a:rPr lang="es-ES" altLang="es-ES" sz="2400" b="0" dirty="0"/>
+              <a:t>Se puede ajustar rápidamente según la situación de la población.</a:t>
+            </a:r>
+          </a:p>
+          <a:p>
+            <a:pPr marL="0" indent="0"/>
+            <a:endParaRPr lang="es-ES" altLang="es-ES" dirty="0"/>
+          </a:p>
+          <a:p>
+            <a:pPr marL="0" indent="0"/>
+            <a:r>
+              <a:rPr lang="es-ES" altLang="es-ES" dirty="0"/>
+              <a:t>Limitaciones:</a:t>
+            </a:r>
+          </a:p>
+          <a:p>
+            <a:pPr>
+              <a:buFontTx/>
+              <a:buChar char="•"/>
+              <a:defRPr/>
+            </a:pPr>
+            <a:r>
+              <a:rPr lang="es-ES" altLang="es-ES" sz="2400" b="0" dirty="0">
+                <a:latin typeface="+mn-lt"/>
+              </a:rPr>
+              <a:t>Si no se mide correctamente la eficiencia de recolección, puede llevar a una sobreexplotación inadvertida.</a:t>
+            </a:r>
+          </a:p>
+          <a:p>
+            <a:pPr>
+              <a:buFontTx/>
+              <a:buChar char="•"/>
+              <a:defRPr/>
+            </a:pPr>
+            <a:r>
+              <a:rPr lang="es-ES" altLang="es-ES" sz="2400" b="0" dirty="0">
+                <a:latin typeface="+mn-lt"/>
+              </a:rPr>
+              <a:t>En especies con alta variabilidad en sus tasas de crecimiento o mortalidad, puede ser difícil predecir con exactitud el esfuerzo adecuado.</a:t>
+            </a:r>
+          </a:p>
+          <a:p>
+            <a:pPr>
+              <a:buFontTx/>
+              <a:buChar char="•"/>
+              <a:defRPr/>
+            </a:pPr>
+            <a:r>
+              <a:rPr lang="es-ES" altLang="es-ES" sz="2400" b="0" dirty="0">
+                <a:latin typeface="+mn-lt"/>
+              </a:rPr>
+              <a:t>Capturas más variables </a:t>
+            </a:r>
+          </a:p>
+          <a:p>
+            <a:pPr marL="0" indent="0"/>
+            <a:endParaRPr lang="es-ES" altLang="es-ES" dirty="0"/>
+          </a:p>
+          <a:p>
+            <a:pPr marL="457200" indent="-457200">
+              <a:buFont typeface="Arial" panose="020B0604020202020204" pitchFamily="34" charset="0"/>
+              <a:buChar char="•"/>
+            </a:pPr>
+            <a:endParaRPr lang="es-ES_tradnl" altLang="en-US" b="0" dirty="0"/>
+          </a:p>
+        </p:txBody>
+      </p:sp>
+      <p:sp>
+        <p:nvSpPr>
+          <p:cNvPr id="8" name="TextBox 107">
+            <a:extLst>
+              <a:ext uri="{FF2B5EF4-FFF2-40B4-BE49-F238E27FC236}">
+                <a16:creationId xmlns:a16="http://schemas.microsoft.com/office/drawing/2014/main" id="{2C4C325B-EE44-87D2-4D86-A083CBE71166}"/>
+              </a:ext>
+            </a:extLst>
+          </p:cNvPr>
+          <p:cNvSpPr txBox="1"/>
+          <p:nvPr/>
+        </p:nvSpPr>
+        <p:spPr>
+          <a:xfrm>
+            <a:off x="749754" y="421372"/>
+            <a:ext cx="10699035" cy="523220"/>
+          </a:xfrm>
+          <a:prstGeom prst="rect">
+            <a:avLst/>
+          </a:prstGeom>
+          <a:solidFill>
+            <a:schemeClr val="tx1"/>
+          </a:solidFill>
+        </p:spPr>
+        <p:txBody>
+          <a:bodyPr wrap="square" rtlCol="0">
+            <a:spAutoFit/>
+          </a:bodyPr>
+          <a:lstStyle/>
+          <a:p>
+            <a:pPr algn="ctr"/>
+            <a:r>
+              <a:rPr lang="es-ES" sz="2800" dirty="0">
+                <a:solidFill>
+                  <a:schemeClr val="bg1"/>
+                </a:solidFill>
+              </a:rPr>
+              <a:t>LIMITACIONES Y VENTAJAS DE LA EXTRACCIÓN POR ESFUERZO FIJO</a:t>
+            </a:r>
+            <a:endParaRPr lang="en-ES" sz="2800" dirty="0">
+              <a:solidFill>
+                <a:schemeClr val="bg1"/>
+              </a:solidFill>
+            </a:endParaRPr>
+          </a:p>
+        </p:txBody>
+      </p:sp>
+    </p:spTree>
+    <p:extLst>
+      <p:ext uri="{BB962C8B-B14F-4D97-AF65-F5344CB8AC3E}">
+        <p14:creationId xmlns:p14="http://schemas.microsoft.com/office/powerpoint/2010/main" val="2960856654"/>
+      </p:ext>
+    </p:extLst>
+  </p:cSld>
+  <p:clrMapOvr>
+    <a:masterClrMapping/>
+  </p:clrMapOvr>
+</p:sld>
+</file>
+
+<file path=ppt/slides/slide8.xml><?xml version="1.0" encoding="utf-8"?>
 <p:sld xmlns:a="http://schemas.openxmlformats.org/drawingml/2006/main" xmlns:r="http://schemas.openxmlformats.org/officeDocument/2006/relationships" xmlns:p="http://schemas.openxmlformats.org/presentationml/2006/main">
   <p:cSld>
     <p:spTree>
@@ -33958,14 +34431,6 @@
   <p:clrMapOvr>
     <a:masterClrMapping/>
   </p:clrMapOvr>
-  <mc:AlternateContent xmlns:mc="http://schemas.openxmlformats.org/markup-compatibility/2006" xmlns:p14="http://schemas.microsoft.com/office/powerpoint/2010/main">
-    <mc:Choice Requires="p14">
-      <p:transition spd="slow" p14:dur="2000" advTm="8890"/>
-    </mc:Choice>
-    <mc:Fallback xmlns="">
-      <p:transition spd="slow" advTm="8890"/>
-    </mc:Fallback>
-  </mc:AlternateContent>
   <p:timing>
     <p:tnLst>
       <p:par>
@@ -34496,6 +34961,459 @@
       <p:bldP spid="181" grpId="0"/>
       <p:bldP spid="182" grpId="0"/>
     </p:bldLst>
+  </p:timing>
+</p:sld>
+</file>
+
+<file path=ppt/slides/slide9.xml><?xml version="1.0" encoding="utf-8"?>
+<p:sld xmlns:a="http://schemas.openxmlformats.org/drawingml/2006/main" xmlns:r="http://schemas.openxmlformats.org/officeDocument/2006/relationships" xmlns:p="http://schemas.openxmlformats.org/presentationml/2006/main">
+  <p:cSld>
+    <p:spTree>
+      <p:nvGrpSpPr>
+        <p:cNvPr id="1" name=""/>
+        <p:cNvGrpSpPr/>
+        <p:nvPr/>
+      </p:nvGrpSpPr>
+      <p:grpSpPr>
+        <a:xfrm>
+          <a:off x="0" y="0"/>
+          <a:ext cx="0" cy="0"/>
+          <a:chOff x="0" y="0"/>
+          <a:chExt cx="0" cy="0"/>
+        </a:xfrm>
+      </p:grpSpPr>
+      <p:sp>
+        <p:nvSpPr>
+          <p:cNvPr id="3" name="Rectangle 2">
+            <a:extLst>
+              <a:ext uri="{FF2B5EF4-FFF2-40B4-BE49-F238E27FC236}">
+                <a16:creationId xmlns:a16="http://schemas.microsoft.com/office/drawing/2014/main" id="{E2995C8E-7948-A7E9-E5AC-8C5C84CE1ED6}"/>
+              </a:ext>
+            </a:extLst>
+          </p:cNvPr>
+          <p:cNvSpPr txBox="1">
+            <a:spLocks noChangeArrowheads="1"/>
+          </p:cNvSpPr>
+          <p:nvPr/>
+        </p:nvSpPr>
+        <p:spPr>
+          <a:xfrm>
+            <a:off x="316283" y="769307"/>
+            <a:ext cx="2590800" cy="954107"/>
+          </a:xfrm>
+          <a:prstGeom prst="rect">
+            <a:avLst/>
+          </a:prstGeom>
+          <a:solidFill>
+            <a:schemeClr val="tx1"/>
+          </a:solidFill>
+        </p:spPr>
+        <p:txBody>
+          <a:bodyPr wrap="square" rtlCol="0">
+            <a:spAutoFit/>
+          </a:bodyPr>
+          <a:lstStyle>
+            <a:defPPr>
+              <a:defRPr lang="en-ES"/>
+            </a:defPPr>
+            <a:lvl1pPr algn="ctr">
+              <a:defRPr sz="2800">
+                <a:solidFill>
+                  <a:schemeClr val="bg1"/>
+                </a:solidFill>
+              </a:defRPr>
+            </a:lvl1pPr>
+          </a:lstStyle>
+          <a:p>
+            <a:r>
+              <a:rPr lang="es-ES_tradnl" altLang="en-US" dirty="0"/>
+              <a:t>Modelos dinámicos</a:t>
+            </a:r>
+          </a:p>
+        </p:txBody>
+      </p:sp>
+      <p:sp>
+        <p:nvSpPr>
+          <p:cNvPr id="5" name="Marcador de número de diapositiva 4">
+            <a:extLst>
+              <a:ext uri="{FF2B5EF4-FFF2-40B4-BE49-F238E27FC236}">
+                <a16:creationId xmlns:a16="http://schemas.microsoft.com/office/drawing/2014/main" id="{1EA62714-439A-85BE-D7C6-3279DF03A7A5}"/>
+              </a:ext>
+            </a:extLst>
+          </p:cNvPr>
+          <p:cNvSpPr>
+            <a:spLocks noGrp="1"/>
+          </p:cNvSpPr>
+          <p:nvPr>
+            <p:ph type="sldNum" sz="quarter" idx="12"/>
+          </p:nvPr>
+        </p:nvSpPr>
+        <p:spPr bwMode="auto">
+          <a:xfrm>
+            <a:off x="6457950" y="6356350"/>
+            <a:ext cx="2057400" cy="365125"/>
+          </a:xfrm>
+          <a:noFill/>
+          <a:extLst>
+            <a:ext uri="{909E8E84-426E-40DD-AFC4-6F175D3DCCD1}">
+              <a14:hiddenFill xmlns:a14="http://schemas.microsoft.com/office/drawing/2010/main">
+                <a:solidFill>
+                  <a:schemeClr val="accent1"/>
+                </a:solidFill>
+              </a14:hiddenFill>
+            </a:ext>
+            <a:ext uri="{91240B29-F687-4F45-9708-019B960494DF}">
+              <a14:hiddenLine xmlns:a14="http://schemas.microsoft.com/office/drawing/2010/main" w="9525">
+                <a:solidFill>
+                  <a:schemeClr val="tx1"/>
+                </a:solidFill>
+                <a:miter lim="800000"/>
+                <a:headEnd/>
+                <a:tailEnd/>
+              </a14:hiddenLine>
+            </a:ext>
+            <a:ext uri="{AF507438-7753-43E0-B8FC-AC1667EBCBE1}">
+              <a14:hiddenEffects xmlns:a14="http://schemas.microsoft.com/office/drawing/2010/main">
+                <a:effectLst>
+                  <a:outerShdw dist="35921" dir="2700000" algn="ctr" rotWithShape="0">
+                    <a:schemeClr val="bg2"/>
+                  </a:outerShdw>
+                </a:effectLst>
+              </a14:hiddenEffects>
+            </a:ext>
+          </a:extLst>
+        </p:spPr>
+        <p:txBody>
+          <a:bodyPr wrap="square" numCol="1" anchorCtr="0" compatLnSpc="1">
+            <a:prstTxWarp prst="textNoShape">
+              <a:avLst/>
+            </a:prstTxWarp>
+          </a:bodyPr>
+          <a:lstStyle>
+            <a:lvl1pPr>
+              <a:defRPr>
+                <a:solidFill>
+                  <a:schemeClr val="tx1"/>
+                </a:solidFill>
+                <a:latin typeface="Aptos" panose="020B0004020202020204" pitchFamily="34" charset="0"/>
+              </a:defRPr>
+            </a:lvl1pPr>
+            <a:lvl2pPr marL="742950" indent="-285750">
+              <a:defRPr>
+                <a:solidFill>
+                  <a:schemeClr val="tx1"/>
+                </a:solidFill>
+                <a:latin typeface="Aptos" panose="020B0004020202020204" pitchFamily="34" charset="0"/>
+              </a:defRPr>
+            </a:lvl2pPr>
+            <a:lvl3pPr marL="1143000" indent="-228600">
+              <a:defRPr>
+                <a:solidFill>
+                  <a:schemeClr val="tx1"/>
+                </a:solidFill>
+                <a:latin typeface="Aptos" panose="020B0004020202020204" pitchFamily="34" charset="0"/>
+              </a:defRPr>
+            </a:lvl3pPr>
+            <a:lvl4pPr marL="1600200" indent="-228600">
+              <a:defRPr>
+                <a:solidFill>
+                  <a:schemeClr val="tx1"/>
+                </a:solidFill>
+                <a:latin typeface="Aptos" panose="020B0004020202020204" pitchFamily="34" charset="0"/>
+              </a:defRPr>
+            </a:lvl4pPr>
+            <a:lvl5pPr marL="2057400" indent="-228600">
+              <a:defRPr>
+                <a:solidFill>
+                  <a:schemeClr val="tx1"/>
+                </a:solidFill>
+                <a:latin typeface="Aptos" panose="020B0004020202020204" pitchFamily="34" charset="0"/>
+              </a:defRPr>
+            </a:lvl5pPr>
+            <a:lvl6pPr marL="2514600" indent="-228600" eaLnBrk="0" fontAlgn="base" hangingPunct="0">
+              <a:spcBef>
+                <a:spcPct val="0"/>
+              </a:spcBef>
+              <a:spcAft>
+                <a:spcPct val="0"/>
+              </a:spcAft>
+              <a:defRPr>
+                <a:solidFill>
+                  <a:schemeClr val="tx1"/>
+                </a:solidFill>
+                <a:latin typeface="Aptos" panose="020B0004020202020204" pitchFamily="34" charset="0"/>
+              </a:defRPr>
+            </a:lvl6pPr>
+            <a:lvl7pPr marL="2971800" indent="-228600" eaLnBrk="0" fontAlgn="base" hangingPunct="0">
+              <a:spcBef>
+                <a:spcPct val="0"/>
+              </a:spcBef>
+              <a:spcAft>
+                <a:spcPct val="0"/>
+              </a:spcAft>
+              <a:defRPr>
+                <a:solidFill>
+                  <a:schemeClr val="tx1"/>
+                </a:solidFill>
+                <a:latin typeface="Aptos" panose="020B0004020202020204" pitchFamily="34" charset="0"/>
+              </a:defRPr>
+            </a:lvl7pPr>
+            <a:lvl8pPr marL="3429000" indent="-228600" eaLnBrk="0" fontAlgn="base" hangingPunct="0">
+              <a:spcBef>
+                <a:spcPct val="0"/>
+              </a:spcBef>
+              <a:spcAft>
+                <a:spcPct val="0"/>
+              </a:spcAft>
+              <a:defRPr>
+                <a:solidFill>
+                  <a:schemeClr val="tx1"/>
+                </a:solidFill>
+                <a:latin typeface="Aptos" panose="020B0004020202020204" pitchFamily="34" charset="0"/>
+              </a:defRPr>
+            </a:lvl8pPr>
+            <a:lvl9pPr marL="3886200" indent="-228600" eaLnBrk="0" fontAlgn="base" hangingPunct="0">
+              <a:spcBef>
+                <a:spcPct val="0"/>
+              </a:spcBef>
+              <a:spcAft>
+                <a:spcPct val="0"/>
+              </a:spcAft>
+              <a:defRPr>
+                <a:solidFill>
+                  <a:schemeClr val="tx1"/>
+                </a:solidFill>
+                <a:latin typeface="Aptos" panose="020B0004020202020204" pitchFamily="34" charset="0"/>
+              </a:defRPr>
+            </a:lvl9pPr>
+          </a:lstStyle>
+          <a:p>
+            <a:pPr fontAlgn="base">
+              <a:spcBef>
+                <a:spcPct val="0"/>
+              </a:spcBef>
+              <a:spcAft>
+                <a:spcPct val="0"/>
+              </a:spcAft>
+            </a:pPr>
+            <a:fld id="{59B202D3-CCCD-6D45-AE62-2F4C0D175057}" type="slidenum">
+              <a:rPr lang="es-ES" altLang="en-US" sz="1400" smtClean="0">
+                <a:latin typeface="Times New Roman" panose="02020603050405020304" pitchFamily="18" charset="0"/>
+              </a:rPr>
+              <a:pPr fontAlgn="base">
+                <a:spcBef>
+                  <a:spcPct val="0"/>
+                </a:spcBef>
+                <a:spcAft>
+                  <a:spcPct val="0"/>
+                </a:spcAft>
+              </a:pPr>
+              <a:t>9</a:t>
+            </a:fld>
+            <a:endParaRPr lang="es-ES" altLang="en-US" sz="1400">
+              <a:latin typeface="Times New Roman" panose="02020603050405020304" pitchFamily="18" charset="0"/>
+            </a:endParaRPr>
+          </a:p>
+        </p:txBody>
+      </p:sp>
+      <p:pic>
+        <p:nvPicPr>
+          <p:cNvPr id="6" name="Picture 4" descr="Begon Fig">
+            <a:extLst>
+              <a:ext uri="{FF2B5EF4-FFF2-40B4-BE49-F238E27FC236}">
+                <a16:creationId xmlns:a16="http://schemas.microsoft.com/office/drawing/2014/main" id="{4711BD11-3FDD-B3FA-022E-540A8167C279}"/>
+              </a:ext>
+            </a:extLst>
+          </p:cNvPr>
+          <p:cNvPicPr>
+            <a:picLocks noChangeAspect="1" noChangeArrowheads="1"/>
+          </p:cNvPicPr>
+          <p:nvPr/>
+        </p:nvPicPr>
+        <p:blipFill>
+          <a:blip r:embed="rId2">
+            <a:extLst>
+              <a:ext uri="{28A0092B-C50C-407E-A947-70E740481C1C}">
+                <a14:useLocalDpi xmlns:a14="http://schemas.microsoft.com/office/drawing/2010/main" val="0"/>
+              </a:ext>
+            </a:extLst>
+          </a:blip>
+          <a:srcRect/>
+          <a:stretch>
+            <a:fillRect/>
+          </a:stretch>
+        </p:blipFill>
+        <p:spPr bwMode="auto">
+          <a:xfrm>
+            <a:off x="3945699" y="-10765"/>
+            <a:ext cx="6209777" cy="6907222"/>
+          </a:xfrm>
+          <a:prstGeom prst="rect">
+            <a:avLst/>
+          </a:prstGeom>
+          <a:noFill/>
+          <a:ln>
+            <a:noFill/>
+          </a:ln>
+          <a:extLst>
+            <a:ext uri="{909E8E84-426E-40DD-AFC4-6F175D3DCCD1}">
+              <a14:hiddenFill xmlns:a14="http://schemas.microsoft.com/office/drawing/2010/main">
+                <a:solidFill>
+                  <a:srgbClr val="FFFFFF"/>
+                </a:solidFill>
+              </a14:hiddenFill>
+            </a:ext>
+            <a:ext uri="{91240B29-F687-4F45-9708-019B960494DF}">
+              <a14:hiddenLine xmlns:a14="http://schemas.microsoft.com/office/drawing/2010/main" w="9525">
+                <a:solidFill>
+                  <a:srgbClr val="000000"/>
+                </a:solidFill>
+                <a:miter lim="800000"/>
+                <a:headEnd/>
+                <a:tailEnd/>
+              </a14:hiddenLine>
+            </a:ext>
+          </a:extLst>
+        </p:spPr>
+      </p:pic>
+    </p:spTree>
+    <p:extLst>
+      <p:ext uri="{BB962C8B-B14F-4D97-AF65-F5344CB8AC3E}">
+        <p14:creationId xmlns:p14="http://schemas.microsoft.com/office/powerpoint/2010/main" val="3351454724"/>
+      </p:ext>
+    </p:extLst>
+  </p:cSld>
+  <p:clrMapOvr>
+    <a:masterClrMapping/>
+  </p:clrMapOvr>
+  <p:timing>
+    <p:tnLst>
+      <p:par>
+        <p:cTn id="1" dur="indefinite" restart="never" nodeType="tmRoot">
+          <p:childTnLst>
+            <p:seq concurrent="1" nextAc="seek">
+              <p:cTn id="2" dur="indefinite" nodeType="mainSeq">
+                <p:childTnLst>
+                  <p:par>
+                    <p:cTn id="3" fill="hold">
+                      <p:stCondLst>
+                        <p:cond delay="indefinite"/>
+                      </p:stCondLst>
+                      <p:childTnLst>
+                        <p:par>
+                          <p:cTn id="4" fill="hold">
+                            <p:stCondLst>
+                              <p:cond delay="0"/>
+                            </p:stCondLst>
+                            <p:childTnLst>
+                              <p:par>
+                                <p:cTn id="5" presetID="42" presetClass="entr" presetSubtype="0" fill="hold" nodeType="clickEffect">
+                                  <p:stCondLst>
+                                    <p:cond delay="0"/>
+                                  </p:stCondLst>
+                                  <p:childTnLst>
+                                    <p:set>
+                                      <p:cBhvr>
+                                        <p:cTn id="6" dur="1" fill="hold">
+                                          <p:stCondLst>
+                                            <p:cond delay="0"/>
+                                          </p:stCondLst>
+                                        </p:cTn>
+                                        <p:tgtEl>
+                                          <p:spTgt spid="6"/>
+                                        </p:tgtEl>
+                                        <p:attrNameLst>
+                                          <p:attrName>style.visibility</p:attrName>
+                                        </p:attrNameLst>
+                                      </p:cBhvr>
+                                      <p:to>
+                                        <p:strVal val="visible"/>
+                                      </p:to>
+                                    </p:set>
+                                    <p:animEffect transition="in" filter="fade">
+                                      <p:cBhvr>
+                                        <p:cTn id="7" dur="1000"/>
+                                        <p:tgtEl>
+                                          <p:spTgt spid="6"/>
+                                        </p:tgtEl>
+                                      </p:cBhvr>
+                                    </p:animEffect>
+                                    <p:anim calcmode="lin" valueType="num">
+                                      <p:cBhvr>
+                                        <p:cTn id="8" dur="1000" fill="hold"/>
+                                        <p:tgtEl>
+                                          <p:spTgt spid="6"/>
+                                        </p:tgtEl>
+                                        <p:attrNameLst>
+                                          <p:attrName>ppt_x</p:attrName>
+                                        </p:attrNameLst>
+                                      </p:cBhvr>
+                                      <p:tavLst>
+                                        <p:tav tm="0">
+                                          <p:val>
+                                            <p:strVal val="#ppt_x"/>
+                                          </p:val>
+                                        </p:tav>
+                                        <p:tav tm="100000">
+                                          <p:val>
+                                            <p:strVal val="#ppt_x"/>
+                                          </p:val>
+                                        </p:tav>
+                                      </p:tavLst>
+                                    </p:anim>
+                                    <p:anim calcmode="lin" valueType="num">
+                                      <p:cBhvr>
+                                        <p:cTn id="9" dur="1000" fill="hold"/>
+                                        <p:tgtEl>
+                                          <p:spTgt spid="6"/>
+                                        </p:tgtEl>
+                                        <p:attrNameLst>
+                                          <p:attrName>ppt_y</p:attrName>
+                                        </p:attrNameLst>
+                                      </p:cBhvr>
+                                      <p:tavLst>
+                                        <p:tav tm="0">
+                                          <p:val>
+                                            <p:strVal val="#ppt_y+.1"/>
+                                          </p:val>
+                                        </p:tav>
+                                        <p:tav tm="100000">
+                                          <p:val>
+                                            <p:strVal val="#ppt_y"/>
+                                          </p:val>
+                                        </p:tav>
+                                      </p:tavLst>
+                                    </p:anim>
+                                  </p:childTnLst>
+                                </p:cTn>
+                              </p:par>
+                            </p:childTnLst>
+                          </p:cTn>
+                        </p:par>
+                      </p:childTnLst>
+                    </p:cTn>
+                  </p:par>
+                </p:childTnLst>
+              </p:cTn>
+              <p:prevCondLst>
+                <p:cond evt="onPrev" delay="0">
+                  <p:tgtEl>
+                    <p:sldTgt/>
+                  </p:tgtEl>
+                </p:cond>
+              </p:prevCondLst>
+              <p:nextCondLst>
+                <p:cond evt="onNext" delay="0">
+                  <p:tgtEl>
+                    <p:sldTgt/>
+                  </p:tgtEl>
+                </p:cond>
+              </p:nextCondLst>
+            </p:seq>
+          </p:childTnLst>
+        </p:cTn>
+      </p:par>
+    </p:tnLst>
   </p:timing>
 </p:sld>
 </file>

</xml_diff>